<commit_message>
Corrected some pictures position in Raciocínio.pptx
Incremented Estudo_Orientado.docx
</commit_message>
<xml_diff>
--- a/Documents/Raciocínio.pptx
+++ b/Documents/Raciocínio.pptx
@@ -234,7 +234,7 @@
             <a:fld id="{88795EB2-ADB7-494B-9DFC-7B7E83C61D05}" type="datetimeFigureOut">
               <a:rPr lang="en-US" smtClean="0"/>
               <a:pPr/>
-              <a:t>6/8/2012</a:t>
+              <a:t>6/10/2012</a:t>
             </a:fld>
             <a:endParaRPr lang="en-US"/>
           </a:p>
@@ -764,7 +764,7 @@
             <a:fld id="{FBF9B097-C427-4DE4-B3CE-4563F699F967}" type="datetime1">
               <a:rPr lang="en-US" smtClean="0"/>
               <a:pPr/>
-              <a:t>6/8/2012</a:t>
+              <a:t>6/10/2012</a:t>
             </a:fld>
             <a:endParaRPr lang="en-US"/>
           </a:p>
@@ -931,7 +931,7 @@
             <a:fld id="{9A8E4FFD-2936-4B04-9183-177669E35AED}" type="datetime1">
               <a:rPr lang="en-US" smtClean="0"/>
               <a:pPr/>
-              <a:t>6/8/2012</a:t>
+              <a:t>6/10/2012</a:t>
             </a:fld>
             <a:endParaRPr lang="en-US"/>
           </a:p>
@@ -1108,7 +1108,7 @@
             <a:fld id="{BD57C515-56CF-465F-BC97-F6AE3620BB20}" type="datetime1">
               <a:rPr lang="en-US" smtClean="0"/>
               <a:pPr/>
-              <a:t>6/8/2012</a:t>
+              <a:t>6/10/2012</a:t>
             </a:fld>
             <a:endParaRPr lang="en-US"/>
           </a:p>
@@ -1275,7 +1275,7 @@
             <a:fld id="{8951D9A6-32CF-48BA-B4D0-AF3D885817D9}" type="datetime1">
               <a:rPr lang="en-US" smtClean="0"/>
               <a:pPr/>
-              <a:t>6/8/2012</a:t>
+              <a:t>6/10/2012</a:t>
             </a:fld>
             <a:endParaRPr lang="en-US"/>
           </a:p>
@@ -1518,7 +1518,7 @@
             <a:fld id="{DA642F5D-6852-48B0-8BB7-BC3DD0364A96}" type="datetime1">
               <a:rPr lang="en-US" smtClean="0"/>
               <a:pPr/>
-              <a:t>6/8/2012</a:t>
+              <a:t>6/10/2012</a:t>
             </a:fld>
             <a:endParaRPr lang="en-US"/>
           </a:p>
@@ -1803,7 +1803,7 @@
             <a:fld id="{25F66096-29F6-48F4-B6FD-E2CF1C320775}" type="datetime1">
               <a:rPr lang="en-US" smtClean="0"/>
               <a:pPr/>
-              <a:t>6/8/2012</a:t>
+              <a:t>6/10/2012</a:t>
             </a:fld>
             <a:endParaRPr lang="en-US"/>
           </a:p>
@@ -2222,7 +2222,7 @@
             <a:fld id="{7278921E-9F43-4C27-BDF7-60A3302795FA}" type="datetime1">
               <a:rPr lang="en-US" smtClean="0"/>
               <a:pPr/>
-              <a:t>6/8/2012</a:t>
+              <a:t>6/10/2012</a:t>
             </a:fld>
             <a:endParaRPr lang="en-US"/>
           </a:p>
@@ -2337,7 +2337,7 @@
             <a:fld id="{DD35359E-93AC-4569-B20A-F3A90EFE17FE}" type="datetime1">
               <a:rPr lang="en-US" smtClean="0"/>
               <a:pPr/>
-              <a:t>6/8/2012</a:t>
+              <a:t>6/10/2012</a:t>
             </a:fld>
             <a:endParaRPr lang="en-US"/>
           </a:p>
@@ -2429,7 +2429,7 @@
             <a:fld id="{047293EB-EF63-4C72-8B03-C1F40696258C}" type="datetime1">
               <a:rPr lang="en-US" smtClean="0"/>
               <a:pPr/>
-              <a:t>6/8/2012</a:t>
+              <a:t>6/10/2012</a:t>
             </a:fld>
             <a:endParaRPr lang="en-US"/>
           </a:p>
@@ -2703,7 +2703,7 @@
             <a:fld id="{119CEA62-F899-444B-AE80-2E7005425960}" type="datetime1">
               <a:rPr lang="en-US" smtClean="0"/>
               <a:pPr/>
-              <a:t>6/8/2012</a:t>
+              <a:t>6/10/2012</a:t>
             </a:fld>
             <a:endParaRPr lang="en-US"/>
           </a:p>
@@ -2953,7 +2953,7 @@
             <a:fld id="{C0DA42CD-8286-4E0F-A9F1-F33BB038C52B}" type="datetime1">
               <a:rPr lang="en-US" smtClean="0"/>
               <a:pPr/>
-              <a:t>6/8/2012</a:t>
+              <a:t>6/10/2012</a:t>
             </a:fld>
             <a:endParaRPr lang="en-US"/>
           </a:p>
@@ -3168,7 +3168,7 @@
             <a:fld id="{EBBD7B98-1FDD-4928-963A-AF8905963555}" type="datetime1">
               <a:rPr lang="en-US" smtClean="0"/>
               <a:pPr/>
-              <a:t>6/8/2012</a:t>
+              <a:t>6/10/2012</a:t>
             </a:fld>
             <a:endParaRPr lang="en-US"/>
           </a:p>
@@ -4297,7 +4297,7 @@
         </p:blipFill>
         <p:spPr bwMode="auto">
           <a:xfrm>
-            <a:off x="2286000" y="228600"/>
+            <a:off x="2286000" y="151384"/>
             <a:ext cx="4267200" cy="6173216"/>
           </a:xfrm>
           <a:prstGeom prst="rect">
@@ -5317,11 +5317,7 @@
             </a:r>
             <a:r>
               <a:rPr lang="en-US" dirty="0" smtClean="0"/>
-              <a:t> </a:t>
-            </a:r>
-            <a:r>
-              <a:rPr lang="en-US" dirty="0" smtClean="0"/>
-              <a:t>a </a:t>
+              <a:t> a </a:t>
             </a:r>
             <a:r>
               <a:rPr lang="en-US" dirty="0" err="1"/>
@@ -6820,7 +6816,11 @@
           <a:bodyPr/>
           <a:lstStyle/>
           <a:p>
-            <a:endParaRPr lang="pt-BR"/>
+            <a:r>
+              <a:rPr lang="pt-BR" dirty="0" smtClean="0"/>
+              <a:t>Indução</a:t>
+            </a:r>
+            <a:endParaRPr lang="pt-BR" dirty="0"/>
           </a:p>
         </p:txBody>
       </p:sp>
@@ -8247,7 +8247,7 @@
         </p:blipFill>
         <p:spPr bwMode="auto">
           <a:xfrm>
-            <a:off x="990600" y="0"/>
+            <a:off x="990600" y="88767"/>
             <a:ext cx="6629400" cy="6235833"/>
           </a:xfrm>
           <a:prstGeom prst="rect">
@@ -8421,7 +8421,7 @@
         </p:blipFill>
         <p:spPr bwMode="auto">
           <a:xfrm>
-            <a:off x="457200" y="304800"/>
+            <a:off x="609600" y="304800"/>
             <a:ext cx="7924800" cy="5960709"/>
           </a:xfrm>
           <a:prstGeom prst="rect">
@@ -10099,6 +10099,13 @@
   <p:clrMapOvr>
     <a:masterClrMapping/>
   </p:clrMapOvr>
+  <p:timing>
+    <p:tnLst>
+      <p:par>
+        <p:cTn id="1" dur="indefinite" restart="never" nodeType="tmRoot"/>
+      </p:par>
+    </p:tnLst>
+  </p:timing>
 </p:sld>
 </file>
 
@@ -10284,6 +10291,13 @@
   <p:clrMapOvr>
     <a:masterClrMapping/>
   </p:clrMapOvr>
+  <p:timing>
+    <p:tnLst>
+      <p:par>
+        <p:cTn id="1" dur="indefinite" restart="never" nodeType="tmRoot"/>
+      </p:par>
+    </p:tnLst>
+  </p:timing>
 </p:sld>
 </file>
 
@@ -10560,7 +10574,11 @@
           <a:bodyPr/>
           <a:lstStyle/>
           <a:p>
-            <a:endParaRPr lang="pt-BR"/>
+            <a:r>
+              <a:rPr lang="pt-BR" dirty="0" smtClean="0"/>
+              <a:t>Escalonamento</a:t>
+            </a:r>
+            <a:endParaRPr lang="pt-BR" dirty="0"/>
           </a:p>
         </p:txBody>
       </p:sp>
@@ -10577,7 +10595,7 @@
         <p:spPr>
           <a:xfrm>
             <a:off x="457200" y="1600201"/>
-            <a:ext cx="2514600" cy="4343400"/>
+            <a:ext cx="8305800" cy="4343400"/>
           </a:xfrm>
         </p:spPr>
         <p:txBody>
@@ -10586,14 +10604,26 @@
           <a:p>
             <a:r>
               <a:rPr lang="pt-BR" dirty="0" smtClean="0"/>
-              <a:t>Simulação de decisão</a:t>
-            </a:r>
+              <a:t>Simulação </a:t>
+            </a:r>
+            <a:r>
+              <a:rPr lang="pt-BR" dirty="0" smtClean="0"/>
+              <a:t>de escalonamento</a:t>
+            </a:r>
+            <a:endParaRPr lang="pt-BR" dirty="0" smtClean="0"/>
           </a:p>
           <a:p>
             <a:pPr lvl="1"/>
             <a:r>
               <a:rPr lang="pt-BR" dirty="0" smtClean="0"/>
               <a:t>Gerente</a:t>
+            </a:r>
+          </a:p>
+          <a:p>
+            <a:pPr lvl="2"/>
+            <a:r>
+              <a:rPr lang="pt-BR" dirty="0" smtClean="0"/>
+              <a:t>Atualmente invariante</a:t>
             </a:r>
             <a:endParaRPr lang="pt-BR" dirty="0"/>
           </a:p>
@@ -10657,7 +10687,7 @@
         </p:blipFill>
         <p:spPr bwMode="auto">
           <a:xfrm>
-            <a:off x="2971800" y="1600200"/>
+            <a:off x="1676400" y="3200400"/>
             <a:ext cx="5724525" cy="2857500"/>
           </a:xfrm>
           <a:prstGeom prst="rect">

</xml_diff>

<commit_message>
Updated ISMA documents Changed some game constants for ISMA presentation
</commit_message>
<xml_diff>
--- a/Documents/Raciocínio.pptx
+++ b/Documents/Raciocínio.pptx
@@ -5,7 +5,7 @@
     <p:sldMasterId id="2147483648" r:id="rId1"/>
   </p:sldMasterIdLst>
   <p:notesMasterIdLst>
-    <p:notesMasterId r:id="rId44"/>
+    <p:notesMasterId r:id="rId48"/>
   </p:notesMasterIdLst>
   <p:sldIdLst>
     <p:sldId id="256" r:id="rId2"/>
@@ -26,30 +26,34 @@
     <p:sldId id="271" r:id="rId17"/>
     <p:sldId id="272" r:id="rId18"/>
     <p:sldId id="273" r:id="rId19"/>
-    <p:sldId id="274" r:id="rId20"/>
-    <p:sldId id="275" r:id="rId21"/>
+    <p:sldId id="275" r:id="rId20"/>
+    <p:sldId id="274" r:id="rId21"/>
     <p:sldId id="276" r:id="rId22"/>
     <p:sldId id="277" r:id="rId23"/>
     <p:sldId id="278" r:id="rId24"/>
     <p:sldId id="279" r:id="rId25"/>
     <p:sldId id="280" r:id="rId26"/>
-    <p:sldId id="281" r:id="rId27"/>
-    <p:sldId id="282" r:id="rId28"/>
-    <p:sldId id="283" r:id="rId29"/>
-    <p:sldId id="298" r:id="rId30"/>
-    <p:sldId id="285" r:id="rId31"/>
-    <p:sldId id="286" r:id="rId32"/>
-    <p:sldId id="287" r:id="rId33"/>
-    <p:sldId id="299" r:id="rId34"/>
-    <p:sldId id="295" r:id="rId35"/>
-    <p:sldId id="290" r:id="rId36"/>
-    <p:sldId id="291" r:id="rId37"/>
-    <p:sldId id="292" r:id="rId38"/>
-    <p:sldId id="293" r:id="rId39"/>
-    <p:sldId id="288" r:id="rId40"/>
-    <p:sldId id="296" r:id="rId41"/>
-    <p:sldId id="289" r:id="rId42"/>
-    <p:sldId id="297" r:id="rId43"/>
+    <p:sldId id="302" r:id="rId27"/>
+    <p:sldId id="281" r:id="rId28"/>
+    <p:sldId id="300" r:id="rId29"/>
+    <p:sldId id="301" r:id="rId30"/>
+    <p:sldId id="282" r:id="rId31"/>
+    <p:sldId id="283" r:id="rId32"/>
+    <p:sldId id="298" r:id="rId33"/>
+    <p:sldId id="303" r:id="rId34"/>
+    <p:sldId id="285" r:id="rId35"/>
+    <p:sldId id="286" r:id="rId36"/>
+    <p:sldId id="287" r:id="rId37"/>
+    <p:sldId id="299" r:id="rId38"/>
+    <p:sldId id="295" r:id="rId39"/>
+    <p:sldId id="290" r:id="rId40"/>
+    <p:sldId id="291" r:id="rId41"/>
+    <p:sldId id="292" r:id="rId42"/>
+    <p:sldId id="293" r:id="rId43"/>
+    <p:sldId id="288" r:id="rId44"/>
+    <p:sldId id="296" r:id="rId45"/>
+    <p:sldId id="289" r:id="rId46"/>
+    <p:sldId id="304" r:id="rId47"/>
   </p:sldIdLst>
   <p:sldSz cx="9144000" cy="6858000" type="screen4x3"/>
   <p:notesSz cx="6858000" cy="9144000"/>
@@ -234,7 +238,7 @@
             <a:fld id="{88795EB2-ADB7-494B-9DFC-7B7E83C61D05}" type="datetimeFigureOut">
               <a:rPr lang="en-US" smtClean="0"/>
               <a:pPr/>
-              <a:t>6/10/2012</a:t>
+              <a:t>6/13/2012</a:t>
             </a:fld>
             <a:endParaRPr lang="en-US"/>
           </a:p>
@@ -582,6 +586,301 @@
 </p:notes>
 </file>
 
+<file path=ppt/notesSlides/notesSlide2.xml><?xml version="1.0" encoding="utf-8"?>
+<p:notes xmlns:a="http://schemas.openxmlformats.org/drawingml/2006/main" xmlns:r="http://schemas.openxmlformats.org/officeDocument/2006/relationships" xmlns:p="http://schemas.openxmlformats.org/presentationml/2006/main">
+  <p:cSld>
+    <p:spTree>
+      <p:nvGrpSpPr>
+        <p:cNvPr id="1" name=""/>
+        <p:cNvGrpSpPr/>
+        <p:nvPr/>
+      </p:nvGrpSpPr>
+      <p:grpSpPr>
+        <a:xfrm>
+          <a:off x="0" y="0"/>
+          <a:ext cx="0" cy="0"/>
+          <a:chOff x="0" y="0"/>
+          <a:chExt cx="0" cy="0"/>
+        </a:xfrm>
+      </p:grpSpPr>
+      <p:sp>
+        <p:nvSpPr>
+          <p:cNvPr id="2" name="Slide Image Placeholder 1"/>
+          <p:cNvSpPr>
+            <a:spLocks noGrp="1" noRot="1" noChangeAspect="1"/>
+          </p:cNvSpPr>
+          <p:nvPr>
+            <p:ph type="sldImg"/>
+          </p:nvPr>
+        </p:nvSpPr>
+        <p:spPr/>
+      </p:sp>
+      <p:sp>
+        <p:nvSpPr>
+          <p:cNvPr id="3" name="Notes Placeholder 2"/>
+          <p:cNvSpPr>
+            <a:spLocks noGrp="1"/>
+          </p:cNvSpPr>
+          <p:nvPr>
+            <p:ph type="body" idx="1"/>
+          </p:nvPr>
+        </p:nvSpPr>
+        <p:spPr/>
+        <p:txBody>
+          <a:bodyPr>
+            <a:normAutofit/>
+          </a:bodyPr>
+          <a:lstStyle/>
+          <a:p>
+            <a:r>
+              <a:rPr lang="pt-BR" dirty="0" smtClean="0"/>
+              <a:t>Continuar</a:t>
+            </a:r>
+            <a:r>
+              <a:rPr lang="pt-BR" baseline="0" dirty="0" smtClean="0"/>
+              <a:t> como representante</a:t>
+            </a:r>
+          </a:p>
+          <a:p>
+            <a:r>
+              <a:rPr lang="pt-BR" baseline="0" dirty="0" smtClean="0"/>
+              <a:t>Concorrer para Senador</a:t>
+            </a:r>
+          </a:p>
+          <a:p>
+            <a:r>
+              <a:rPr lang="pt-BR" baseline="0" dirty="0" smtClean="0"/>
+              <a:t>Se aposentar</a:t>
+            </a:r>
+          </a:p>
+          <a:p>
+            <a:endParaRPr lang="pt-BR" baseline="0" dirty="0" smtClean="0"/>
+          </a:p>
+          <a:p>
+            <a:r>
+              <a:rPr lang="pt-BR" baseline="0" dirty="0" smtClean="0"/>
+              <a:t>Pesquisa de </a:t>
+            </a:r>
+            <a:r>
+              <a:rPr lang="pt-BR" baseline="0" dirty="0" err="1" smtClean="0"/>
+              <a:t>opiniao</a:t>
+            </a:r>
+            <a:endParaRPr lang="pt-BR" dirty="0"/>
+          </a:p>
+        </p:txBody>
+      </p:sp>
+      <p:sp>
+        <p:nvSpPr>
+          <p:cNvPr id="4" name="Slide Number Placeholder 3"/>
+          <p:cNvSpPr>
+            <a:spLocks noGrp="1"/>
+          </p:cNvSpPr>
+          <p:nvPr>
+            <p:ph type="sldNum" sz="quarter" idx="10"/>
+          </p:nvPr>
+        </p:nvSpPr>
+        <p:spPr/>
+        <p:txBody>
+          <a:bodyPr/>
+          <a:lstStyle/>
+          <a:p>
+            <a:fld id="{2C1BF405-2C36-4DEC-AA31-36A3639B45CE}" type="slidenum">
+              <a:rPr lang="en-US" smtClean="0"/>
+              <a:pPr/>
+              <a:t>30</a:t>
+            </a:fld>
+            <a:endParaRPr lang="en-US"/>
+          </a:p>
+        </p:txBody>
+      </p:sp>
+    </p:spTree>
+  </p:cSld>
+  <p:clrMapOvr>
+    <a:masterClrMapping/>
+  </p:clrMapOvr>
+</p:notes>
+</file>
+
+<file path=ppt/notesSlides/notesSlide3.xml><?xml version="1.0" encoding="utf-8"?>
+<p:notes xmlns:a="http://schemas.openxmlformats.org/drawingml/2006/main" xmlns:r="http://schemas.openxmlformats.org/officeDocument/2006/relationships" xmlns:p="http://schemas.openxmlformats.org/presentationml/2006/main">
+  <p:cSld>
+    <p:spTree>
+      <p:nvGrpSpPr>
+        <p:cNvPr id="1" name=""/>
+        <p:cNvGrpSpPr/>
+        <p:nvPr/>
+      </p:nvGrpSpPr>
+      <p:grpSpPr>
+        <a:xfrm>
+          <a:off x="0" y="0"/>
+          <a:ext cx="0" cy="0"/>
+          <a:chOff x="0" y="0"/>
+          <a:chExt cx="0" cy="0"/>
+        </a:xfrm>
+      </p:grpSpPr>
+      <p:sp>
+        <p:nvSpPr>
+          <p:cNvPr id="2" name="Slide Image Placeholder 1"/>
+          <p:cNvSpPr>
+            <a:spLocks noGrp="1" noRot="1" noChangeAspect="1"/>
+          </p:cNvSpPr>
+          <p:nvPr>
+            <p:ph type="sldImg"/>
+          </p:nvPr>
+        </p:nvSpPr>
+        <p:spPr/>
+      </p:sp>
+      <p:sp>
+        <p:nvSpPr>
+          <p:cNvPr id="3" name="Notes Placeholder 2"/>
+          <p:cNvSpPr>
+            <a:spLocks noGrp="1"/>
+          </p:cNvSpPr>
+          <p:nvPr>
+            <p:ph type="body" idx="1"/>
+          </p:nvPr>
+        </p:nvSpPr>
+        <p:spPr/>
+        <p:txBody>
+          <a:bodyPr>
+            <a:normAutofit/>
+          </a:bodyPr>
+          <a:lstStyle/>
+          <a:p>
+            <a:r>
+              <a:rPr lang="pt-BR" dirty="0" smtClean="0"/>
+              <a:t>Custo da terceira arvore</a:t>
+            </a:r>
+            <a:r>
+              <a:rPr lang="pt-BR" baseline="0" dirty="0" smtClean="0"/>
+              <a:t> de Intenções: 200 </a:t>
+            </a:r>
+            <a:r>
+              <a:rPr lang="pt-BR" baseline="0" dirty="0" err="1" smtClean="0"/>
+              <a:t>rep</a:t>
+            </a:r>
+            <a:r>
+              <a:rPr lang="pt-BR" baseline="0" dirty="0" smtClean="0"/>
+              <a:t> e 145</a:t>
+            </a:r>
+            <a:endParaRPr lang="pt-BR" dirty="0"/>
+          </a:p>
+        </p:txBody>
+      </p:sp>
+      <p:sp>
+        <p:nvSpPr>
+          <p:cNvPr id="4" name="Slide Number Placeholder 3"/>
+          <p:cNvSpPr>
+            <a:spLocks noGrp="1"/>
+          </p:cNvSpPr>
+          <p:nvPr>
+            <p:ph type="sldNum" sz="quarter" idx="10"/>
+          </p:nvPr>
+        </p:nvSpPr>
+        <p:spPr/>
+        <p:txBody>
+          <a:bodyPr/>
+          <a:lstStyle/>
+          <a:p>
+            <a:fld id="{2C1BF405-2C36-4DEC-AA31-36A3639B45CE}" type="slidenum">
+              <a:rPr lang="en-US" smtClean="0"/>
+              <a:pPr/>
+              <a:t>31</a:t>
+            </a:fld>
+            <a:endParaRPr lang="en-US"/>
+          </a:p>
+        </p:txBody>
+      </p:sp>
+    </p:spTree>
+  </p:cSld>
+  <p:clrMapOvr>
+    <a:masterClrMapping/>
+  </p:clrMapOvr>
+</p:notes>
+</file>
+
+<file path=ppt/notesSlides/notesSlide4.xml><?xml version="1.0" encoding="utf-8"?>
+<p:notes xmlns:a="http://schemas.openxmlformats.org/drawingml/2006/main" xmlns:r="http://schemas.openxmlformats.org/officeDocument/2006/relationships" xmlns:p="http://schemas.openxmlformats.org/presentationml/2006/main">
+  <p:cSld>
+    <p:spTree>
+      <p:nvGrpSpPr>
+        <p:cNvPr id="1" name=""/>
+        <p:cNvGrpSpPr/>
+        <p:nvPr/>
+      </p:nvGrpSpPr>
+      <p:grpSpPr>
+        <a:xfrm>
+          <a:off x="0" y="0"/>
+          <a:ext cx="0" cy="0"/>
+          <a:chOff x="0" y="0"/>
+          <a:chExt cx="0" cy="0"/>
+        </a:xfrm>
+      </p:grpSpPr>
+      <p:sp>
+        <p:nvSpPr>
+          <p:cNvPr id="2" name="Slide Image Placeholder 1"/>
+          <p:cNvSpPr>
+            <a:spLocks noGrp="1" noRot="1" noChangeAspect="1"/>
+          </p:cNvSpPr>
+          <p:nvPr>
+            <p:ph type="sldImg"/>
+          </p:nvPr>
+        </p:nvSpPr>
+        <p:spPr/>
+      </p:sp>
+      <p:sp>
+        <p:nvSpPr>
+          <p:cNvPr id="3" name="Notes Placeholder 2"/>
+          <p:cNvSpPr>
+            <a:spLocks noGrp="1"/>
+          </p:cNvSpPr>
+          <p:nvPr>
+            <p:ph type="body" idx="1"/>
+          </p:nvPr>
+        </p:nvSpPr>
+        <p:spPr/>
+        <p:txBody>
+          <a:bodyPr>
+            <a:normAutofit/>
+          </a:bodyPr>
+          <a:lstStyle/>
+          <a:p>
+            <a:endParaRPr lang="pt-BR" dirty="0"/>
+          </a:p>
+        </p:txBody>
+      </p:sp>
+      <p:sp>
+        <p:nvSpPr>
+          <p:cNvPr id="4" name="Slide Number Placeholder 3"/>
+          <p:cNvSpPr>
+            <a:spLocks noGrp="1"/>
+          </p:cNvSpPr>
+          <p:nvPr>
+            <p:ph type="sldNum" sz="quarter" idx="10"/>
+          </p:nvPr>
+        </p:nvSpPr>
+        <p:spPr/>
+        <p:txBody>
+          <a:bodyPr/>
+          <a:lstStyle/>
+          <a:p>
+            <a:fld id="{2C1BF405-2C36-4DEC-AA31-36A3639B45CE}" type="slidenum">
+              <a:rPr lang="en-US" smtClean="0"/>
+              <a:pPr/>
+              <a:t>37</a:t>
+            </a:fld>
+            <a:endParaRPr lang="en-US"/>
+          </a:p>
+        </p:txBody>
+      </p:sp>
+    </p:spTree>
+  </p:cSld>
+  <p:clrMapOvr>
+    <a:masterClrMapping/>
+  </p:clrMapOvr>
+</p:notes>
+</file>
+
 <file path=ppt/slideLayouts/slideLayout1.xml><?xml version="1.0" encoding="utf-8"?>
 <p:sldLayout xmlns:a="http://schemas.openxmlformats.org/drawingml/2006/main" xmlns:r="http://schemas.openxmlformats.org/officeDocument/2006/relationships" xmlns:p="http://schemas.openxmlformats.org/presentationml/2006/main" type="title" preserve="1">
   <p:cSld name="Title Slide">
@@ -764,7 +1063,7 @@
             <a:fld id="{FBF9B097-C427-4DE4-B3CE-4563F699F967}" type="datetime1">
               <a:rPr lang="en-US" smtClean="0"/>
               <a:pPr/>
-              <a:t>6/10/2012</a:t>
+              <a:t>6/13/2012</a:t>
             </a:fld>
             <a:endParaRPr lang="en-US"/>
           </a:p>
@@ -931,7 +1230,7 @@
             <a:fld id="{9A8E4FFD-2936-4B04-9183-177669E35AED}" type="datetime1">
               <a:rPr lang="en-US" smtClean="0"/>
               <a:pPr/>
-              <a:t>6/10/2012</a:t>
+              <a:t>6/13/2012</a:t>
             </a:fld>
             <a:endParaRPr lang="en-US"/>
           </a:p>
@@ -1108,7 +1407,7 @@
             <a:fld id="{BD57C515-56CF-465F-BC97-F6AE3620BB20}" type="datetime1">
               <a:rPr lang="en-US" smtClean="0"/>
               <a:pPr/>
-              <a:t>6/10/2012</a:t>
+              <a:t>6/13/2012</a:t>
             </a:fld>
             <a:endParaRPr lang="en-US"/>
           </a:p>
@@ -1275,7 +1574,7 @@
             <a:fld id="{8951D9A6-32CF-48BA-B4D0-AF3D885817D9}" type="datetime1">
               <a:rPr lang="en-US" smtClean="0"/>
               <a:pPr/>
-              <a:t>6/10/2012</a:t>
+              <a:t>6/13/2012</a:t>
             </a:fld>
             <a:endParaRPr lang="en-US"/>
           </a:p>
@@ -1518,7 +1817,7 @@
             <a:fld id="{DA642F5D-6852-48B0-8BB7-BC3DD0364A96}" type="datetime1">
               <a:rPr lang="en-US" smtClean="0"/>
               <a:pPr/>
-              <a:t>6/10/2012</a:t>
+              <a:t>6/13/2012</a:t>
             </a:fld>
             <a:endParaRPr lang="en-US"/>
           </a:p>
@@ -1803,7 +2102,7 @@
             <a:fld id="{25F66096-29F6-48F4-B6FD-E2CF1C320775}" type="datetime1">
               <a:rPr lang="en-US" smtClean="0"/>
               <a:pPr/>
-              <a:t>6/10/2012</a:t>
+              <a:t>6/13/2012</a:t>
             </a:fld>
             <a:endParaRPr lang="en-US"/>
           </a:p>
@@ -2222,7 +2521,7 @@
             <a:fld id="{7278921E-9F43-4C27-BDF7-60A3302795FA}" type="datetime1">
               <a:rPr lang="en-US" smtClean="0"/>
               <a:pPr/>
-              <a:t>6/10/2012</a:t>
+              <a:t>6/13/2012</a:t>
             </a:fld>
             <a:endParaRPr lang="en-US"/>
           </a:p>
@@ -2337,7 +2636,7 @@
             <a:fld id="{DD35359E-93AC-4569-B20A-F3A90EFE17FE}" type="datetime1">
               <a:rPr lang="en-US" smtClean="0"/>
               <a:pPr/>
-              <a:t>6/10/2012</a:t>
+              <a:t>6/13/2012</a:t>
             </a:fld>
             <a:endParaRPr lang="en-US"/>
           </a:p>
@@ -2429,7 +2728,7 @@
             <a:fld id="{047293EB-EF63-4C72-8B03-C1F40696258C}" type="datetime1">
               <a:rPr lang="en-US" smtClean="0"/>
               <a:pPr/>
-              <a:t>6/10/2012</a:t>
+              <a:t>6/13/2012</a:t>
             </a:fld>
             <a:endParaRPr lang="en-US"/>
           </a:p>
@@ -2703,7 +3002,7 @@
             <a:fld id="{119CEA62-F899-444B-AE80-2E7005425960}" type="datetime1">
               <a:rPr lang="en-US" smtClean="0"/>
               <a:pPr/>
-              <a:t>6/10/2012</a:t>
+              <a:t>6/13/2012</a:t>
             </a:fld>
             <a:endParaRPr lang="en-US"/>
           </a:p>
@@ -2953,7 +3252,7 @@
             <a:fld id="{C0DA42CD-8286-4E0F-A9F1-F33BB038C52B}" type="datetime1">
               <a:rPr lang="en-US" smtClean="0"/>
               <a:pPr/>
-              <a:t>6/10/2012</a:t>
+              <a:t>6/13/2012</a:t>
             </a:fld>
             <a:endParaRPr lang="en-US"/>
           </a:p>
@@ -3168,7 +3467,7 @@
             <a:fld id="{EBBD7B98-1FDD-4928-963A-AF8905963555}" type="datetime1">
               <a:rPr lang="en-US" smtClean="0"/>
               <a:pPr/>
-              <a:t>6/10/2012</a:t>
+              <a:t>6/13/2012</a:t>
             </a:fld>
             <a:endParaRPr lang="en-US"/>
           </a:p>
@@ -6032,6 +6331,17 @@
               <a:rPr lang="pt-BR" dirty="0" smtClean="0"/>
               <a:t>}</a:t>
             </a:r>
+          </a:p>
+          <a:p>
+            <a:pPr lvl="2"/>
+            <a:endParaRPr lang="pt-BR" dirty="0" smtClean="0"/>
+          </a:p>
+          <a:p>
+            <a:pPr lvl="1"/>
+            <a:r>
+              <a:rPr lang="pt-BR" dirty="0" smtClean="0"/>
+              <a:t>Classe{N, P}</a:t>
+            </a:r>
             <a:endParaRPr lang="pt-BR" dirty="0"/>
           </a:p>
         </p:txBody>
@@ -6144,6 +6454,692 @@
 </file>
 
 <file path=ppt/slides/slide19.xml><?xml version="1.0" encoding="utf-8"?>
+<p:sld xmlns:a="http://schemas.openxmlformats.org/drawingml/2006/main" xmlns:r="http://schemas.openxmlformats.org/officeDocument/2006/relationships" xmlns:p="http://schemas.openxmlformats.org/presentationml/2006/main">
+  <p:cSld>
+    <p:spTree>
+      <p:nvGrpSpPr>
+        <p:cNvPr id="1" name=""/>
+        <p:cNvGrpSpPr/>
+        <p:nvPr/>
+      </p:nvGrpSpPr>
+      <p:grpSpPr>
+        <a:xfrm>
+          <a:off x="0" y="0"/>
+          <a:ext cx="0" cy="0"/>
+          <a:chOff x="0" y="0"/>
+          <a:chExt cx="0" cy="0"/>
+        </a:xfrm>
+      </p:grpSpPr>
+      <p:sp>
+        <p:nvSpPr>
+          <p:cNvPr id="2" name="Title 1"/>
+          <p:cNvSpPr>
+            <a:spLocks noGrp="1"/>
+          </p:cNvSpPr>
+          <p:nvPr>
+            <p:ph type="title"/>
+          </p:nvPr>
+        </p:nvSpPr>
+        <p:spPr/>
+        <p:txBody>
+          <a:bodyPr/>
+          <a:lstStyle/>
+          <a:p>
+            <a:r>
+              <a:rPr lang="pt-BR" dirty="0" smtClean="0"/>
+              <a:t>Indução</a:t>
+            </a:r>
+            <a:endParaRPr lang="pt-BR" dirty="0"/>
+          </a:p>
+        </p:txBody>
+      </p:sp>
+      <p:sp>
+        <p:nvSpPr>
+          <p:cNvPr id="3" name="Content Placeholder 2"/>
+          <p:cNvSpPr>
+            <a:spLocks noGrp="1"/>
+          </p:cNvSpPr>
+          <p:nvPr>
+            <p:ph idx="1"/>
+          </p:nvPr>
+        </p:nvSpPr>
+        <p:spPr/>
+        <p:txBody>
+          <a:bodyPr>
+            <a:normAutofit fontScale="92500" lnSpcReduction="20000"/>
+          </a:bodyPr>
+          <a:lstStyle/>
+          <a:p>
+            <a:r>
+              <a:rPr lang="pt-BR" dirty="0" smtClean="0"/>
+              <a:t>As folhas da árvore de decisão são os nomes das classes.</a:t>
+            </a:r>
+          </a:p>
+          <a:p>
+            <a:r>
+              <a:rPr lang="pt-BR" dirty="0" smtClean="0"/>
+              <a:t>Demais nós representam testes baseados em atributos com um ramo para cada possível resultado. </a:t>
+            </a:r>
+          </a:p>
+          <a:p>
+            <a:r>
+              <a:rPr lang="pt-BR" dirty="0" smtClean="0"/>
+              <a:t>Para classificar um objeto:</a:t>
+            </a:r>
+          </a:p>
+          <a:p>
+            <a:pPr lvl="1"/>
+            <a:r>
+              <a:rPr lang="pt-BR" dirty="0" smtClean="0"/>
+              <a:t> inicia-se pela raiz da árvore, avalia o teste, e siga o ramo de acordo com o resultado. </a:t>
+            </a:r>
+          </a:p>
+          <a:p>
+            <a:pPr lvl="1"/>
+            <a:r>
+              <a:rPr lang="pt-BR" dirty="0" smtClean="0"/>
+              <a:t>O processo continua até que a folha seja encontrada, onde o objeto é afirmado pertencer a classe com o nome da folha.</a:t>
+            </a:r>
+            <a:endParaRPr lang="pt-BR" dirty="0"/>
+          </a:p>
+        </p:txBody>
+      </p:sp>
+      <p:sp>
+        <p:nvSpPr>
+          <p:cNvPr id="5" name="Footer Placeholder 3"/>
+          <p:cNvSpPr>
+            <a:spLocks noGrp="1"/>
+          </p:cNvSpPr>
+          <p:nvPr>
+            <p:ph type="ftr" sz="quarter" idx="11"/>
+          </p:nvPr>
+        </p:nvSpPr>
+        <p:spPr>
+          <a:xfrm>
+            <a:off x="762000" y="6356350"/>
+            <a:ext cx="7086600" cy="365125"/>
+          </a:xfrm>
+        </p:spPr>
+        <p:txBody>
+          <a:bodyPr/>
+          <a:lstStyle/>
+          <a:p>
+            <a:r>
+              <a:rPr lang="pt-BR" dirty="0"/>
+              <a:t>QUINLAN, J. </a:t>
+            </a:r>
+            <a:r>
+              <a:rPr lang="pt-BR" dirty="0" err="1"/>
+              <a:t>Induction</a:t>
+            </a:r>
+            <a:r>
+              <a:rPr lang="pt-BR" dirty="0"/>
+              <a:t> </a:t>
+            </a:r>
+            <a:r>
+              <a:rPr lang="pt-BR" dirty="0" err="1"/>
+              <a:t>of</a:t>
+            </a:r>
+            <a:r>
+              <a:rPr lang="pt-BR" dirty="0"/>
+              <a:t> </a:t>
+            </a:r>
+            <a:r>
+              <a:rPr lang="pt-BR" dirty="0" err="1"/>
+              <a:t>Decision</a:t>
+            </a:r>
+            <a:r>
+              <a:rPr lang="pt-BR" dirty="0"/>
+              <a:t> </a:t>
+            </a:r>
+            <a:r>
+              <a:rPr lang="pt-BR" dirty="0" err="1"/>
+              <a:t>Trees</a:t>
+            </a:r>
+            <a:r>
+              <a:rPr lang="pt-BR" dirty="0"/>
+              <a:t>. </a:t>
+            </a:r>
+            <a:r>
+              <a:rPr lang="pt-BR" b="1" dirty="0"/>
+              <a:t>In: Machine </a:t>
+            </a:r>
+            <a:r>
+              <a:rPr lang="pt-BR" b="1" dirty="0" err="1"/>
+              <a:t>Learning</a:t>
+            </a:r>
+            <a:r>
+              <a:rPr lang="pt-BR" dirty="0"/>
+              <a:t>, v. 1, p. 81–106, 1986. </a:t>
+            </a:r>
+            <a:endParaRPr lang="en-US" dirty="0"/>
+          </a:p>
+          <a:p>
+            <a:endParaRPr lang="en-US" dirty="0"/>
+          </a:p>
+        </p:txBody>
+      </p:sp>
+      <p:sp>
+        <p:nvSpPr>
+          <p:cNvPr id="6" name="Slide Number Placeholder 5"/>
+          <p:cNvSpPr>
+            <a:spLocks noGrp="1"/>
+          </p:cNvSpPr>
+          <p:nvPr>
+            <p:ph type="sldNum" sz="quarter" idx="12"/>
+          </p:nvPr>
+        </p:nvSpPr>
+        <p:spPr/>
+        <p:txBody>
+          <a:bodyPr/>
+          <a:lstStyle/>
+          <a:p>
+            <a:fld id="{C2596E1E-EB91-4095-BA0D-C3A644609A86}" type="slidenum">
+              <a:rPr lang="en-US" smtClean="0"/>
+              <a:pPr/>
+              <a:t>19</a:t>
+            </a:fld>
+            <a:endParaRPr lang="en-US"/>
+          </a:p>
+        </p:txBody>
+      </p:sp>
+    </p:spTree>
+  </p:cSld>
+  <p:clrMapOvr>
+    <a:masterClrMapping/>
+  </p:clrMapOvr>
+</p:sld>
+</file>
+
+<file path=ppt/slides/slide2.xml><?xml version="1.0" encoding="utf-8"?>
+<p:sld xmlns:a="http://schemas.openxmlformats.org/drawingml/2006/main" xmlns:r="http://schemas.openxmlformats.org/officeDocument/2006/relationships" xmlns:p="http://schemas.openxmlformats.org/presentationml/2006/main">
+  <p:cSld>
+    <p:spTree>
+      <p:nvGrpSpPr>
+        <p:cNvPr id="1" name=""/>
+        <p:cNvGrpSpPr/>
+        <p:nvPr/>
+      </p:nvGrpSpPr>
+      <p:grpSpPr>
+        <a:xfrm>
+          <a:off x="0" y="0"/>
+          <a:ext cx="0" cy="0"/>
+          <a:chOff x="0" y="0"/>
+          <a:chExt cx="0" cy="0"/>
+        </a:xfrm>
+      </p:grpSpPr>
+      <p:sp>
+        <p:nvSpPr>
+          <p:cNvPr id="2" name="Title 1"/>
+          <p:cNvSpPr>
+            <a:spLocks noGrp="1"/>
+          </p:cNvSpPr>
+          <p:nvPr>
+            <p:ph type="title"/>
+          </p:nvPr>
+        </p:nvSpPr>
+        <p:spPr/>
+        <p:txBody>
+          <a:bodyPr/>
+          <a:lstStyle/>
+          <a:p>
+            <a:r>
+              <a:rPr lang="pt-BR" dirty="0" smtClean="0"/>
+              <a:t>Sumário</a:t>
+            </a:r>
+            <a:endParaRPr lang="en-US" dirty="0"/>
+          </a:p>
+        </p:txBody>
+      </p:sp>
+      <p:sp>
+        <p:nvSpPr>
+          <p:cNvPr id="3" name="Content Placeholder 2"/>
+          <p:cNvSpPr>
+            <a:spLocks noGrp="1"/>
+          </p:cNvSpPr>
+          <p:nvPr>
+            <p:ph idx="1"/>
+          </p:nvPr>
+        </p:nvSpPr>
+        <p:spPr>
+          <a:xfrm>
+            <a:off x="457200" y="1600200"/>
+            <a:ext cx="3429000" cy="4525963"/>
+          </a:xfrm>
+        </p:spPr>
+        <p:txBody>
+          <a:bodyPr>
+            <a:normAutofit fontScale="77500" lnSpcReduction="20000"/>
+          </a:bodyPr>
+          <a:lstStyle/>
+          <a:p>
+            <a:r>
+              <a:rPr lang="pt-BR" dirty="0" smtClean="0"/>
+              <a:t>Lógica </a:t>
+            </a:r>
+            <a:r>
+              <a:rPr lang="pt-BR" dirty="0" err="1" smtClean="0"/>
+              <a:t>Fuzzy</a:t>
+            </a:r>
+            <a:endParaRPr lang="pt-BR" dirty="0" smtClean="0"/>
+          </a:p>
+          <a:p>
+            <a:pPr lvl="1"/>
+            <a:r>
+              <a:rPr lang="pt-BR" dirty="0" smtClean="0"/>
+              <a:t>Inferência</a:t>
+            </a:r>
+            <a:endParaRPr lang="pt-BR" dirty="0"/>
+          </a:p>
+          <a:p>
+            <a:pPr lvl="1"/>
+            <a:r>
+              <a:rPr lang="pt-BR" dirty="0" smtClean="0"/>
+              <a:t>Representação de conhecimento</a:t>
+            </a:r>
+          </a:p>
+          <a:p>
+            <a:pPr lvl="1"/>
+            <a:r>
+              <a:rPr lang="pt-BR" dirty="0" smtClean="0"/>
+              <a:t>Raciocínio</a:t>
+            </a:r>
+          </a:p>
+          <a:p>
+            <a:r>
+              <a:rPr lang="pt-BR" dirty="0" smtClean="0"/>
+              <a:t>Árvores de Decisão</a:t>
+            </a:r>
+          </a:p>
+          <a:p>
+            <a:pPr lvl="1"/>
+            <a:r>
+              <a:rPr lang="pt-BR" dirty="0" smtClean="0"/>
+              <a:t>Criação</a:t>
+            </a:r>
+          </a:p>
+          <a:p>
+            <a:pPr lvl="1"/>
+            <a:r>
+              <a:rPr lang="pt-BR" dirty="0" smtClean="0"/>
+              <a:t>Preditivo</a:t>
+            </a:r>
+          </a:p>
+          <a:p>
+            <a:pPr lvl="1"/>
+            <a:r>
+              <a:rPr lang="pt-BR" dirty="0" smtClean="0"/>
+              <a:t>Indução</a:t>
+            </a:r>
+          </a:p>
+          <a:p>
+            <a:pPr lvl="1"/>
+            <a:r>
+              <a:rPr lang="pt-BR" dirty="0" smtClean="0"/>
+              <a:t>Vantagens</a:t>
+            </a:r>
+          </a:p>
+          <a:p>
+            <a:pPr lvl="1"/>
+            <a:r>
+              <a:rPr lang="pt-BR" dirty="0" smtClean="0"/>
+              <a:t>Desvantagens</a:t>
+            </a:r>
+          </a:p>
+          <a:p>
+            <a:r>
+              <a:rPr lang="pt-BR" dirty="0" smtClean="0"/>
+              <a:t>Árvore de Decisão para agentes BDI</a:t>
+            </a:r>
+          </a:p>
+        </p:txBody>
+      </p:sp>
+      <p:sp>
+        <p:nvSpPr>
+          <p:cNvPr id="4" name="Footer Placeholder 3"/>
+          <p:cNvSpPr>
+            <a:spLocks noGrp="1"/>
+          </p:cNvSpPr>
+          <p:nvPr>
+            <p:ph type="ftr" sz="quarter" idx="11"/>
+          </p:nvPr>
+        </p:nvSpPr>
+        <p:spPr/>
+        <p:txBody>
+          <a:bodyPr/>
+          <a:lstStyle/>
+          <a:p>
+            <a:endParaRPr lang="en-US"/>
+          </a:p>
+        </p:txBody>
+      </p:sp>
+      <p:sp>
+        <p:nvSpPr>
+          <p:cNvPr id="5" name="Slide Number Placeholder 4"/>
+          <p:cNvSpPr>
+            <a:spLocks noGrp="1"/>
+          </p:cNvSpPr>
+          <p:nvPr>
+            <p:ph type="sldNum" sz="quarter" idx="12"/>
+          </p:nvPr>
+        </p:nvSpPr>
+        <p:spPr/>
+        <p:txBody>
+          <a:bodyPr/>
+          <a:lstStyle/>
+          <a:p>
+            <a:fld id="{C2596E1E-EB91-4095-BA0D-C3A644609A86}" type="slidenum">
+              <a:rPr lang="en-US" smtClean="0"/>
+              <a:pPr/>
+              <a:t>2</a:t>
+            </a:fld>
+            <a:endParaRPr lang="en-US"/>
+          </a:p>
+        </p:txBody>
+      </p:sp>
+      <p:sp>
+        <p:nvSpPr>
+          <p:cNvPr id="9" name="Content Placeholder 2"/>
+          <p:cNvSpPr txBox="1">
+            <a:spLocks/>
+          </p:cNvSpPr>
+          <p:nvPr/>
+        </p:nvSpPr>
+        <p:spPr>
+          <a:xfrm>
+            <a:off x="4343400" y="1600200"/>
+            <a:ext cx="3429000" cy="4525963"/>
+          </a:xfrm>
+          <a:prstGeom prst="rect">
+            <a:avLst/>
+          </a:prstGeom>
+        </p:spPr>
+        <p:txBody>
+          <a:bodyPr vert="horz" lIns="91440" tIns="45720" rIns="91440" bIns="45720" rtlCol="0">
+            <a:normAutofit/>
+          </a:bodyPr>
+          <a:lstStyle/>
+          <a:p>
+            <a:pPr lvl="1"/>
+            <a:r>
+              <a:rPr lang="pt-BR" sz="2200" dirty="0" smtClean="0"/>
+              <a:t>Trabalho proposto:</a:t>
+            </a:r>
+          </a:p>
+          <a:p>
+            <a:pPr marL="742950" marR="0" lvl="1" indent="-285750" algn="l" defTabSz="914400" rtl="0" eaLnBrk="1" fontAlgn="auto" latinLnBrk="0" hangingPunct="1">
+              <a:lnSpc>
+                <a:spcPct val="100000"/>
+              </a:lnSpc>
+              <a:spcBef>
+                <a:spcPct val="20000"/>
+              </a:spcBef>
+              <a:spcAft>
+                <a:spcPts val="0"/>
+              </a:spcAft>
+              <a:buClrTx/>
+              <a:buSzTx/>
+              <a:buFont typeface="Arial" pitchFamily="34" charset="0"/>
+              <a:buChar char="–"/>
+              <a:tabLst/>
+              <a:defRPr/>
+            </a:pPr>
+            <a:r>
+              <a:rPr kumimoji="0" lang="pt-BR" sz="2200" b="0" i="0" u="none" strike="noStrike" kern="1200" cap="none" spc="0" normalizeH="0" baseline="0" noProof="0" dirty="0" smtClean="0">
+                <a:ln>
+                  <a:noFill/>
+                </a:ln>
+                <a:solidFill>
+                  <a:schemeClr val="tx1"/>
+                </a:solidFill>
+                <a:effectLst/>
+                <a:uLnTx/>
+                <a:uFillTx/>
+                <a:latin typeface="+mn-lt"/>
+                <a:ea typeface="+mn-ea"/>
+                <a:cs typeface="+mn-cs"/>
+              </a:rPr>
+              <a:t>SDM</a:t>
+            </a:r>
+          </a:p>
+          <a:p>
+            <a:pPr marL="742950" marR="0" lvl="1" indent="-285750" algn="l" defTabSz="914400" rtl="0" eaLnBrk="1" fontAlgn="auto" latinLnBrk="0" hangingPunct="1">
+              <a:lnSpc>
+                <a:spcPct val="100000"/>
+              </a:lnSpc>
+              <a:spcBef>
+                <a:spcPct val="20000"/>
+              </a:spcBef>
+              <a:spcAft>
+                <a:spcPts val="0"/>
+              </a:spcAft>
+              <a:buClrTx/>
+              <a:buSzTx/>
+              <a:buFont typeface="Arial" pitchFamily="34" charset="0"/>
+              <a:buChar char="–"/>
+              <a:tabLst/>
+              <a:defRPr/>
+            </a:pPr>
+            <a:r>
+              <a:rPr kumimoji="0" lang="pt-BR" sz="2200" b="0" i="0" u="none" strike="noStrike" kern="1200" cap="none" spc="0" normalizeH="0" baseline="0" noProof="0" dirty="0" smtClean="0">
+                <a:ln>
+                  <a:noFill/>
+                </a:ln>
+                <a:solidFill>
+                  <a:schemeClr val="tx1"/>
+                </a:solidFill>
+                <a:effectLst/>
+                <a:uLnTx/>
+                <a:uFillTx/>
+                <a:latin typeface="+mn-lt"/>
+                <a:ea typeface="+mn-ea"/>
+                <a:cs typeface="+mn-cs"/>
+              </a:rPr>
+              <a:t>Proposta</a:t>
+            </a:r>
+          </a:p>
+          <a:p>
+            <a:pPr marL="742950" marR="0" lvl="1" indent="-285750" algn="l" defTabSz="914400" rtl="0" eaLnBrk="1" fontAlgn="auto" latinLnBrk="0" hangingPunct="1">
+              <a:lnSpc>
+                <a:spcPct val="100000"/>
+              </a:lnSpc>
+              <a:spcBef>
+                <a:spcPct val="20000"/>
+              </a:spcBef>
+              <a:spcAft>
+                <a:spcPts val="0"/>
+              </a:spcAft>
+              <a:buClrTx/>
+              <a:buSzTx/>
+              <a:buFont typeface="Arial" pitchFamily="34" charset="0"/>
+              <a:buChar char="–"/>
+              <a:tabLst/>
+              <a:defRPr/>
+            </a:pPr>
+            <a:r>
+              <a:rPr kumimoji="0" lang="pt-BR" sz="2200" b="0" i="0" u="none" strike="noStrike" kern="1200" cap="none" spc="0" normalizeH="0" baseline="0" noProof="0" dirty="0" smtClean="0">
+                <a:ln>
+                  <a:noFill/>
+                </a:ln>
+                <a:solidFill>
+                  <a:schemeClr val="tx1"/>
+                </a:solidFill>
+                <a:effectLst/>
+                <a:uLnTx/>
+                <a:uFillTx/>
+                <a:latin typeface="+mn-lt"/>
+                <a:ea typeface="+mn-ea"/>
+                <a:cs typeface="+mn-cs"/>
+              </a:rPr>
+              <a:t>Árvores de Decisão</a:t>
+            </a:r>
+          </a:p>
+          <a:p>
+            <a:pPr marL="1200150" lvl="2" indent="-285750">
+              <a:spcBef>
+                <a:spcPct val="20000"/>
+              </a:spcBef>
+              <a:buFont typeface="Arial" pitchFamily="34" charset="0"/>
+              <a:buChar char="–"/>
+            </a:pPr>
+            <a:r>
+              <a:rPr lang="pt-BR" sz="2200" dirty="0" smtClean="0"/>
+              <a:t>Analista</a:t>
+            </a:r>
+          </a:p>
+          <a:p>
+            <a:pPr marL="1200150" lvl="2" indent="-285750">
+              <a:spcBef>
+                <a:spcPct val="20000"/>
+              </a:spcBef>
+              <a:buFont typeface="Arial" pitchFamily="34" charset="0"/>
+              <a:buChar char="–"/>
+            </a:pPr>
+            <a:r>
+              <a:rPr kumimoji="0" lang="pt-BR" sz="2200" b="0" i="0" u="none" strike="noStrike" kern="1200" cap="none" spc="0" normalizeH="0" baseline="0" noProof="0" dirty="0" smtClean="0">
+                <a:ln>
+                  <a:noFill/>
+                </a:ln>
+                <a:solidFill>
+                  <a:schemeClr val="tx1"/>
+                </a:solidFill>
+                <a:effectLst/>
+                <a:uLnTx/>
+                <a:uFillTx/>
+                <a:latin typeface="+mn-lt"/>
+                <a:ea typeface="+mn-ea"/>
+                <a:cs typeface="+mn-cs"/>
+              </a:rPr>
+              <a:t>Arquiteto</a:t>
+            </a:r>
+          </a:p>
+          <a:p>
+            <a:pPr marL="1200150" lvl="2" indent="-285750">
+              <a:spcBef>
+                <a:spcPct val="20000"/>
+              </a:spcBef>
+              <a:buFont typeface="Arial" pitchFamily="34" charset="0"/>
+              <a:buChar char="–"/>
+            </a:pPr>
+            <a:r>
+              <a:rPr lang="pt-BR" sz="2200" dirty="0" smtClean="0"/>
+              <a:t>Gerente</a:t>
+            </a:r>
+          </a:p>
+          <a:p>
+            <a:pPr marL="1200150" lvl="2" indent="-285750">
+              <a:spcBef>
+                <a:spcPct val="20000"/>
+              </a:spcBef>
+              <a:buFont typeface="Arial" pitchFamily="34" charset="0"/>
+              <a:buChar char="–"/>
+            </a:pPr>
+            <a:r>
+              <a:rPr kumimoji="0" lang="pt-BR" sz="2200" b="0" i="0" u="none" strike="noStrike" kern="1200" cap="none" spc="0" normalizeH="0" baseline="0" noProof="0" dirty="0" smtClean="0">
+                <a:ln>
+                  <a:noFill/>
+                </a:ln>
+                <a:solidFill>
+                  <a:schemeClr val="tx1"/>
+                </a:solidFill>
+                <a:effectLst/>
+                <a:uLnTx/>
+                <a:uFillTx/>
+                <a:latin typeface="+mn-lt"/>
+                <a:ea typeface="+mn-ea"/>
+                <a:cs typeface="+mn-cs"/>
+              </a:rPr>
+              <a:t>Programador</a:t>
+            </a:r>
+          </a:p>
+          <a:p>
+            <a:pPr marL="742950" lvl="1" indent="-285750">
+              <a:spcBef>
+                <a:spcPct val="20000"/>
+              </a:spcBef>
+              <a:buFont typeface="Arial" pitchFamily="34" charset="0"/>
+              <a:buChar char="–"/>
+            </a:pPr>
+            <a:r>
+              <a:rPr lang="pt-BR" sz="2200" dirty="0" smtClean="0"/>
+              <a:t>Decisões Externas</a:t>
+            </a:r>
+          </a:p>
+          <a:p>
+            <a:pPr marL="742950" lvl="1" indent="-285750">
+              <a:spcBef>
+                <a:spcPct val="20000"/>
+              </a:spcBef>
+              <a:buFont typeface="Arial" pitchFamily="34" charset="0"/>
+              <a:buChar char="–"/>
+            </a:pPr>
+            <a:r>
+              <a:rPr kumimoji="0" lang="pt-BR" sz="2200" b="0" i="0" u="none" strike="noStrike" kern="1200" cap="none" spc="0" normalizeH="0" baseline="0" noProof="0" dirty="0" smtClean="0">
+                <a:ln>
+                  <a:noFill/>
+                </a:ln>
+                <a:solidFill>
+                  <a:schemeClr val="tx1"/>
+                </a:solidFill>
+                <a:effectLst/>
+                <a:uLnTx/>
+                <a:uFillTx/>
+                <a:latin typeface="+mn-lt"/>
+                <a:ea typeface="+mn-ea"/>
+                <a:cs typeface="+mn-cs"/>
+              </a:rPr>
+              <a:t>Ações</a:t>
+            </a:r>
+            <a:r>
+              <a:rPr kumimoji="0" lang="pt-BR" sz="2200" b="0" i="0" u="none" strike="noStrike" kern="1200" cap="none" spc="0" normalizeH="0" noProof="0" dirty="0" smtClean="0">
+                <a:ln>
+                  <a:noFill/>
+                </a:ln>
+                <a:solidFill>
+                  <a:schemeClr val="tx1"/>
+                </a:solidFill>
+                <a:effectLst/>
+                <a:uLnTx/>
+                <a:uFillTx/>
+                <a:latin typeface="+mn-lt"/>
+                <a:ea typeface="+mn-ea"/>
+                <a:cs typeface="+mn-cs"/>
+              </a:rPr>
+              <a:t> e Eventos</a:t>
+            </a:r>
+            <a:endParaRPr kumimoji="0" lang="pt-BR" sz="2200" b="0" i="0" u="none" strike="noStrike" kern="1200" cap="none" spc="0" normalizeH="0" baseline="0" noProof="0" dirty="0" smtClean="0">
+              <a:ln>
+                <a:noFill/>
+              </a:ln>
+              <a:solidFill>
+                <a:schemeClr val="tx1"/>
+              </a:solidFill>
+              <a:effectLst/>
+              <a:uLnTx/>
+              <a:uFillTx/>
+              <a:latin typeface="+mn-lt"/>
+              <a:ea typeface="+mn-ea"/>
+              <a:cs typeface="+mn-cs"/>
+            </a:endParaRPr>
+          </a:p>
+        </p:txBody>
+      </p:sp>
+    </p:spTree>
+  </p:cSld>
+  <p:clrMapOvr>
+    <a:masterClrMapping/>
+  </p:clrMapOvr>
+  <p:timing>
+    <p:tnLst>
+      <p:par>
+        <p:cTn id="1" dur="indefinite" restart="never" nodeType="tmRoot"/>
+      </p:par>
+    </p:tnLst>
+  </p:timing>
+</p:sld>
+</file>
+
+<file path=ppt/slides/slide20.xml><?xml version="1.0" encoding="utf-8"?>
 <p:sld xmlns:a="http://schemas.openxmlformats.org/drawingml/2006/main" xmlns:r="http://schemas.openxmlformats.org/officeDocument/2006/relationships" xmlns:p="http://schemas.openxmlformats.org/presentationml/2006/main">
   <p:cSld>
     <p:spTree>
@@ -6267,692 +7263,6 @@
       <p:sp>
         <p:nvSpPr>
           <p:cNvPr id="7" name="Slide Number Placeholder 6"/>
-          <p:cNvSpPr>
-            <a:spLocks noGrp="1"/>
-          </p:cNvSpPr>
-          <p:nvPr>
-            <p:ph type="sldNum" sz="quarter" idx="12"/>
-          </p:nvPr>
-        </p:nvSpPr>
-        <p:spPr/>
-        <p:txBody>
-          <a:bodyPr/>
-          <a:lstStyle/>
-          <a:p>
-            <a:fld id="{C2596E1E-EB91-4095-BA0D-C3A644609A86}" type="slidenum">
-              <a:rPr lang="en-US" smtClean="0"/>
-              <a:pPr/>
-              <a:t>19</a:t>
-            </a:fld>
-            <a:endParaRPr lang="en-US"/>
-          </a:p>
-        </p:txBody>
-      </p:sp>
-    </p:spTree>
-  </p:cSld>
-  <p:clrMapOvr>
-    <a:masterClrMapping/>
-  </p:clrMapOvr>
-</p:sld>
-</file>
-
-<file path=ppt/slides/slide2.xml><?xml version="1.0" encoding="utf-8"?>
-<p:sld xmlns:a="http://schemas.openxmlformats.org/drawingml/2006/main" xmlns:r="http://schemas.openxmlformats.org/officeDocument/2006/relationships" xmlns:p="http://schemas.openxmlformats.org/presentationml/2006/main">
-  <p:cSld>
-    <p:spTree>
-      <p:nvGrpSpPr>
-        <p:cNvPr id="1" name=""/>
-        <p:cNvGrpSpPr/>
-        <p:nvPr/>
-      </p:nvGrpSpPr>
-      <p:grpSpPr>
-        <a:xfrm>
-          <a:off x="0" y="0"/>
-          <a:ext cx="0" cy="0"/>
-          <a:chOff x="0" y="0"/>
-          <a:chExt cx="0" cy="0"/>
-        </a:xfrm>
-      </p:grpSpPr>
-      <p:sp>
-        <p:nvSpPr>
-          <p:cNvPr id="2" name="Title 1"/>
-          <p:cNvSpPr>
-            <a:spLocks noGrp="1"/>
-          </p:cNvSpPr>
-          <p:nvPr>
-            <p:ph type="title"/>
-          </p:nvPr>
-        </p:nvSpPr>
-        <p:spPr/>
-        <p:txBody>
-          <a:bodyPr/>
-          <a:lstStyle/>
-          <a:p>
-            <a:r>
-              <a:rPr lang="pt-BR" dirty="0" smtClean="0"/>
-              <a:t>Sumário</a:t>
-            </a:r>
-            <a:endParaRPr lang="en-US" dirty="0"/>
-          </a:p>
-        </p:txBody>
-      </p:sp>
-      <p:sp>
-        <p:nvSpPr>
-          <p:cNvPr id="3" name="Content Placeholder 2"/>
-          <p:cNvSpPr>
-            <a:spLocks noGrp="1"/>
-          </p:cNvSpPr>
-          <p:nvPr>
-            <p:ph idx="1"/>
-          </p:nvPr>
-        </p:nvSpPr>
-        <p:spPr>
-          <a:xfrm>
-            <a:off x="457200" y="1600200"/>
-            <a:ext cx="3429000" cy="4525963"/>
-          </a:xfrm>
-        </p:spPr>
-        <p:txBody>
-          <a:bodyPr>
-            <a:normAutofit fontScale="77500" lnSpcReduction="20000"/>
-          </a:bodyPr>
-          <a:lstStyle/>
-          <a:p>
-            <a:r>
-              <a:rPr lang="pt-BR" dirty="0" smtClean="0"/>
-              <a:t>Lógica </a:t>
-            </a:r>
-            <a:r>
-              <a:rPr lang="pt-BR" dirty="0" err="1" smtClean="0"/>
-              <a:t>Fuzz</a:t>
-            </a:r>
-            <a:endParaRPr lang="pt-BR" dirty="0" smtClean="0"/>
-          </a:p>
-          <a:p>
-            <a:pPr lvl="1"/>
-            <a:r>
-              <a:rPr lang="pt-BR" dirty="0" smtClean="0"/>
-              <a:t>Inferência</a:t>
-            </a:r>
-            <a:endParaRPr lang="pt-BR" dirty="0"/>
-          </a:p>
-          <a:p>
-            <a:pPr lvl="1"/>
-            <a:r>
-              <a:rPr lang="pt-BR" dirty="0" smtClean="0"/>
-              <a:t>Representação de conhecimento</a:t>
-            </a:r>
-          </a:p>
-          <a:p>
-            <a:pPr lvl="1"/>
-            <a:r>
-              <a:rPr lang="pt-BR" dirty="0" smtClean="0"/>
-              <a:t>Raciocínio</a:t>
-            </a:r>
-          </a:p>
-          <a:p>
-            <a:r>
-              <a:rPr lang="pt-BR" dirty="0" smtClean="0"/>
-              <a:t>Árvores de Decisão</a:t>
-            </a:r>
-          </a:p>
-          <a:p>
-            <a:pPr lvl="1"/>
-            <a:r>
-              <a:rPr lang="pt-BR" dirty="0" smtClean="0"/>
-              <a:t>Criação</a:t>
-            </a:r>
-          </a:p>
-          <a:p>
-            <a:pPr lvl="1"/>
-            <a:r>
-              <a:rPr lang="pt-BR" dirty="0" smtClean="0"/>
-              <a:t>Preditivo</a:t>
-            </a:r>
-          </a:p>
-          <a:p>
-            <a:pPr lvl="1"/>
-            <a:r>
-              <a:rPr lang="pt-BR" dirty="0" smtClean="0"/>
-              <a:t>Indução</a:t>
-            </a:r>
-          </a:p>
-          <a:p>
-            <a:pPr lvl="1"/>
-            <a:r>
-              <a:rPr lang="pt-BR" dirty="0" smtClean="0"/>
-              <a:t>Vantagens</a:t>
-            </a:r>
-          </a:p>
-          <a:p>
-            <a:pPr lvl="1"/>
-            <a:r>
-              <a:rPr lang="pt-BR" dirty="0" smtClean="0"/>
-              <a:t>Desvantagens</a:t>
-            </a:r>
-          </a:p>
-          <a:p>
-            <a:r>
-              <a:rPr lang="pt-BR" dirty="0" smtClean="0"/>
-              <a:t>Árvore de Decisão para agentes BDI</a:t>
-            </a:r>
-          </a:p>
-        </p:txBody>
-      </p:sp>
-      <p:sp>
-        <p:nvSpPr>
-          <p:cNvPr id="4" name="Footer Placeholder 3"/>
-          <p:cNvSpPr>
-            <a:spLocks noGrp="1"/>
-          </p:cNvSpPr>
-          <p:nvPr>
-            <p:ph type="ftr" sz="quarter" idx="11"/>
-          </p:nvPr>
-        </p:nvSpPr>
-        <p:spPr/>
-        <p:txBody>
-          <a:bodyPr/>
-          <a:lstStyle/>
-          <a:p>
-            <a:endParaRPr lang="en-US"/>
-          </a:p>
-        </p:txBody>
-      </p:sp>
-      <p:sp>
-        <p:nvSpPr>
-          <p:cNvPr id="5" name="Slide Number Placeholder 4"/>
-          <p:cNvSpPr>
-            <a:spLocks noGrp="1"/>
-          </p:cNvSpPr>
-          <p:nvPr>
-            <p:ph type="sldNum" sz="quarter" idx="12"/>
-          </p:nvPr>
-        </p:nvSpPr>
-        <p:spPr/>
-        <p:txBody>
-          <a:bodyPr/>
-          <a:lstStyle/>
-          <a:p>
-            <a:fld id="{C2596E1E-EB91-4095-BA0D-C3A644609A86}" type="slidenum">
-              <a:rPr lang="en-US" smtClean="0"/>
-              <a:pPr/>
-              <a:t>2</a:t>
-            </a:fld>
-            <a:endParaRPr lang="en-US"/>
-          </a:p>
-        </p:txBody>
-      </p:sp>
-      <p:sp>
-        <p:nvSpPr>
-          <p:cNvPr id="9" name="Content Placeholder 2"/>
-          <p:cNvSpPr txBox="1">
-            <a:spLocks/>
-          </p:cNvSpPr>
-          <p:nvPr/>
-        </p:nvSpPr>
-        <p:spPr>
-          <a:xfrm>
-            <a:off x="4343400" y="1600200"/>
-            <a:ext cx="3429000" cy="4525963"/>
-          </a:xfrm>
-          <a:prstGeom prst="rect">
-            <a:avLst/>
-          </a:prstGeom>
-        </p:spPr>
-        <p:txBody>
-          <a:bodyPr vert="horz" lIns="91440" tIns="45720" rIns="91440" bIns="45720" rtlCol="0">
-            <a:normAutofit/>
-          </a:bodyPr>
-          <a:lstStyle/>
-          <a:p>
-            <a:pPr lvl="1"/>
-            <a:r>
-              <a:rPr lang="pt-BR" sz="2200" dirty="0" smtClean="0"/>
-              <a:t>Trabalho proposto:</a:t>
-            </a:r>
-          </a:p>
-          <a:p>
-            <a:pPr marL="742950" marR="0" lvl="1" indent="-285750" algn="l" defTabSz="914400" rtl="0" eaLnBrk="1" fontAlgn="auto" latinLnBrk="0" hangingPunct="1">
-              <a:lnSpc>
-                <a:spcPct val="100000"/>
-              </a:lnSpc>
-              <a:spcBef>
-                <a:spcPct val="20000"/>
-              </a:spcBef>
-              <a:spcAft>
-                <a:spcPts val="0"/>
-              </a:spcAft>
-              <a:buClrTx/>
-              <a:buSzTx/>
-              <a:buFont typeface="Arial" pitchFamily="34" charset="0"/>
-              <a:buChar char="–"/>
-              <a:tabLst/>
-              <a:defRPr/>
-            </a:pPr>
-            <a:r>
-              <a:rPr kumimoji="0" lang="pt-BR" sz="2200" b="0" i="0" u="none" strike="noStrike" kern="1200" cap="none" spc="0" normalizeH="0" baseline="0" noProof="0" dirty="0" smtClean="0">
-                <a:ln>
-                  <a:noFill/>
-                </a:ln>
-                <a:solidFill>
-                  <a:schemeClr val="tx1"/>
-                </a:solidFill>
-                <a:effectLst/>
-                <a:uLnTx/>
-                <a:uFillTx/>
-                <a:latin typeface="+mn-lt"/>
-                <a:ea typeface="+mn-ea"/>
-                <a:cs typeface="+mn-cs"/>
-              </a:rPr>
-              <a:t>SDM</a:t>
-            </a:r>
-          </a:p>
-          <a:p>
-            <a:pPr marL="742950" marR="0" lvl="1" indent="-285750" algn="l" defTabSz="914400" rtl="0" eaLnBrk="1" fontAlgn="auto" latinLnBrk="0" hangingPunct="1">
-              <a:lnSpc>
-                <a:spcPct val="100000"/>
-              </a:lnSpc>
-              <a:spcBef>
-                <a:spcPct val="20000"/>
-              </a:spcBef>
-              <a:spcAft>
-                <a:spcPts val="0"/>
-              </a:spcAft>
-              <a:buClrTx/>
-              <a:buSzTx/>
-              <a:buFont typeface="Arial" pitchFamily="34" charset="0"/>
-              <a:buChar char="–"/>
-              <a:tabLst/>
-              <a:defRPr/>
-            </a:pPr>
-            <a:r>
-              <a:rPr kumimoji="0" lang="pt-BR" sz="2200" b="0" i="0" u="none" strike="noStrike" kern="1200" cap="none" spc="0" normalizeH="0" baseline="0" noProof="0" dirty="0" smtClean="0">
-                <a:ln>
-                  <a:noFill/>
-                </a:ln>
-                <a:solidFill>
-                  <a:schemeClr val="tx1"/>
-                </a:solidFill>
-                <a:effectLst/>
-                <a:uLnTx/>
-                <a:uFillTx/>
-                <a:latin typeface="+mn-lt"/>
-                <a:ea typeface="+mn-ea"/>
-                <a:cs typeface="+mn-cs"/>
-              </a:rPr>
-              <a:t>Proposta</a:t>
-            </a:r>
-          </a:p>
-          <a:p>
-            <a:pPr marL="742950" marR="0" lvl="1" indent="-285750" algn="l" defTabSz="914400" rtl="0" eaLnBrk="1" fontAlgn="auto" latinLnBrk="0" hangingPunct="1">
-              <a:lnSpc>
-                <a:spcPct val="100000"/>
-              </a:lnSpc>
-              <a:spcBef>
-                <a:spcPct val="20000"/>
-              </a:spcBef>
-              <a:spcAft>
-                <a:spcPts val="0"/>
-              </a:spcAft>
-              <a:buClrTx/>
-              <a:buSzTx/>
-              <a:buFont typeface="Arial" pitchFamily="34" charset="0"/>
-              <a:buChar char="–"/>
-              <a:tabLst/>
-              <a:defRPr/>
-            </a:pPr>
-            <a:r>
-              <a:rPr kumimoji="0" lang="pt-BR" sz="2200" b="0" i="0" u="none" strike="noStrike" kern="1200" cap="none" spc="0" normalizeH="0" baseline="0" noProof="0" dirty="0" smtClean="0">
-                <a:ln>
-                  <a:noFill/>
-                </a:ln>
-                <a:solidFill>
-                  <a:schemeClr val="tx1"/>
-                </a:solidFill>
-                <a:effectLst/>
-                <a:uLnTx/>
-                <a:uFillTx/>
-                <a:latin typeface="+mn-lt"/>
-                <a:ea typeface="+mn-ea"/>
-                <a:cs typeface="+mn-cs"/>
-              </a:rPr>
-              <a:t>Árvores de Decisão</a:t>
-            </a:r>
-          </a:p>
-          <a:p>
-            <a:pPr marL="1200150" lvl="2" indent="-285750">
-              <a:spcBef>
-                <a:spcPct val="20000"/>
-              </a:spcBef>
-              <a:buFont typeface="Arial" pitchFamily="34" charset="0"/>
-              <a:buChar char="–"/>
-            </a:pPr>
-            <a:r>
-              <a:rPr lang="pt-BR" sz="2200" dirty="0" smtClean="0"/>
-              <a:t>Analista</a:t>
-            </a:r>
-          </a:p>
-          <a:p>
-            <a:pPr marL="1200150" lvl="2" indent="-285750">
-              <a:spcBef>
-                <a:spcPct val="20000"/>
-              </a:spcBef>
-              <a:buFont typeface="Arial" pitchFamily="34" charset="0"/>
-              <a:buChar char="–"/>
-            </a:pPr>
-            <a:r>
-              <a:rPr kumimoji="0" lang="pt-BR" sz="2200" b="0" i="0" u="none" strike="noStrike" kern="1200" cap="none" spc="0" normalizeH="0" baseline="0" noProof="0" dirty="0" smtClean="0">
-                <a:ln>
-                  <a:noFill/>
-                </a:ln>
-                <a:solidFill>
-                  <a:schemeClr val="tx1"/>
-                </a:solidFill>
-                <a:effectLst/>
-                <a:uLnTx/>
-                <a:uFillTx/>
-                <a:latin typeface="+mn-lt"/>
-                <a:ea typeface="+mn-ea"/>
-                <a:cs typeface="+mn-cs"/>
-              </a:rPr>
-              <a:t>Arquiteto</a:t>
-            </a:r>
-          </a:p>
-          <a:p>
-            <a:pPr marL="1200150" lvl="2" indent="-285750">
-              <a:spcBef>
-                <a:spcPct val="20000"/>
-              </a:spcBef>
-              <a:buFont typeface="Arial" pitchFamily="34" charset="0"/>
-              <a:buChar char="–"/>
-            </a:pPr>
-            <a:r>
-              <a:rPr lang="pt-BR" sz="2200" dirty="0" smtClean="0"/>
-              <a:t>Gerente</a:t>
-            </a:r>
-          </a:p>
-          <a:p>
-            <a:pPr marL="1200150" lvl="2" indent="-285750">
-              <a:spcBef>
-                <a:spcPct val="20000"/>
-              </a:spcBef>
-              <a:buFont typeface="Arial" pitchFamily="34" charset="0"/>
-              <a:buChar char="–"/>
-            </a:pPr>
-            <a:r>
-              <a:rPr kumimoji="0" lang="pt-BR" sz="2200" b="0" i="0" u="none" strike="noStrike" kern="1200" cap="none" spc="0" normalizeH="0" baseline="0" noProof="0" dirty="0" smtClean="0">
-                <a:ln>
-                  <a:noFill/>
-                </a:ln>
-                <a:solidFill>
-                  <a:schemeClr val="tx1"/>
-                </a:solidFill>
-                <a:effectLst/>
-                <a:uLnTx/>
-                <a:uFillTx/>
-                <a:latin typeface="+mn-lt"/>
-                <a:ea typeface="+mn-ea"/>
-                <a:cs typeface="+mn-cs"/>
-              </a:rPr>
-              <a:t>Programador</a:t>
-            </a:r>
-          </a:p>
-          <a:p>
-            <a:pPr marL="742950" lvl="1" indent="-285750">
-              <a:spcBef>
-                <a:spcPct val="20000"/>
-              </a:spcBef>
-              <a:buFont typeface="Arial" pitchFamily="34" charset="0"/>
-              <a:buChar char="–"/>
-            </a:pPr>
-            <a:r>
-              <a:rPr lang="pt-BR" sz="2200" dirty="0" smtClean="0"/>
-              <a:t>Decisões Externas</a:t>
-            </a:r>
-          </a:p>
-          <a:p>
-            <a:pPr marL="742950" lvl="1" indent="-285750">
-              <a:spcBef>
-                <a:spcPct val="20000"/>
-              </a:spcBef>
-              <a:buFont typeface="Arial" pitchFamily="34" charset="0"/>
-              <a:buChar char="–"/>
-            </a:pPr>
-            <a:r>
-              <a:rPr kumimoji="0" lang="pt-BR" sz="2200" b="0" i="0" u="none" strike="noStrike" kern="1200" cap="none" spc="0" normalizeH="0" baseline="0" noProof="0" dirty="0" smtClean="0">
-                <a:ln>
-                  <a:noFill/>
-                </a:ln>
-                <a:solidFill>
-                  <a:schemeClr val="tx1"/>
-                </a:solidFill>
-                <a:effectLst/>
-                <a:uLnTx/>
-                <a:uFillTx/>
-                <a:latin typeface="+mn-lt"/>
-                <a:ea typeface="+mn-ea"/>
-                <a:cs typeface="+mn-cs"/>
-              </a:rPr>
-              <a:t>Ações</a:t>
-            </a:r>
-            <a:r>
-              <a:rPr kumimoji="0" lang="pt-BR" sz="2200" b="0" i="0" u="none" strike="noStrike" kern="1200" cap="none" spc="0" normalizeH="0" noProof="0" dirty="0" smtClean="0">
-                <a:ln>
-                  <a:noFill/>
-                </a:ln>
-                <a:solidFill>
-                  <a:schemeClr val="tx1"/>
-                </a:solidFill>
-                <a:effectLst/>
-                <a:uLnTx/>
-                <a:uFillTx/>
-                <a:latin typeface="+mn-lt"/>
-                <a:ea typeface="+mn-ea"/>
-                <a:cs typeface="+mn-cs"/>
-              </a:rPr>
-              <a:t> e Eventos</a:t>
-            </a:r>
-            <a:endParaRPr kumimoji="0" lang="pt-BR" sz="2200" b="0" i="0" u="none" strike="noStrike" kern="1200" cap="none" spc="0" normalizeH="0" baseline="0" noProof="0" dirty="0" smtClean="0">
-              <a:ln>
-                <a:noFill/>
-              </a:ln>
-              <a:solidFill>
-                <a:schemeClr val="tx1"/>
-              </a:solidFill>
-              <a:effectLst/>
-              <a:uLnTx/>
-              <a:uFillTx/>
-              <a:latin typeface="+mn-lt"/>
-              <a:ea typeface="+mn-ea"/>
-              <a:cs typeface="+mn-cs"/>
-            </a:endParaRPr>
-          </a:p>
-        </p:txBody>
-      </p:sp>
-    </p:spTree>
-  </p:cSld>
-  <p:clrMapOvr>
-    <a:masterClrMapping/>
-  </p:clrMapOvr>
-  <p:timing>
-    <p:tnLst>
-      <p:par>
-        <p:cTn id="1" dur="indefinite" restart="never" nodeType="tmRoot"/>
-      </p:par>
-    </p:tnLst>
-  </p:timing>
-</p:sld>
-</file>
-
-<file path=ppt/slides/slide20.xml><?xml version="1.0" encoding="utf-8"?>
-<p:sld xmlns:a="http://schemas.openxmlformats.org/drawingml/2006/main" xmlns:r="http://schemas.openxmlformats.org/officeDocument/2006/relationships" xmlns:p="http://schemas.openxmlformats.org/presentationml/2006/main">
-  <p:cSld>
-    <p:spTree>
-      <p:nvGrpSpPr>
-        <p:cNvPr id="1" name=""/>
-        <p:cNvGrpSpPr/>
-        <p:nvPr/>
-      </p:nvGrpSpPr>
-      <p:grpSpPr>
-        <a:xfrm>
-          <a:off x="0" y="0"/>
-          <a:ext cx="0" cy="0"/>
-          <a:chOff x="0" y="0"/>
-          <a:chExt cx="0" cy="0"/>
-        </a:xfrm>
-      </p:grpSpPr>
-      <p:sp>
-        <p:nvSpPr>
-          <p:cNvPr id="2" name="Title 1"/>
-          <p:cNvSpPr>
-            <a:spLocks noGrp="1"/>
-          </p:cNvSpPr>
-          <p:nvPr>
-            <p:ph type="title"/>
-          </p:nvPr>
-        </p:nvSpPr>
-        <p:spPr/>
-        <p:txBody>
-          <a:bodyPr/>
-          <a:lstStyle/>
-          <a:p>
-            <a:r>
-              <a:rPr lang="pt-BR" dirty="0" smtClean="0"/>
-              <a:t>Indução</a:t>
-            </a:r>
-            <a:endParaRPr lang="pt-BR" dirty="0"/>
-          </a:p>
-        </p:txBody>
-      </p:sp>
-      <p:sp>
-        <p:nvSpPr>
-          <p:cNvPr id="3" name="Content Placeholder 2"/>
-          <p:cNvSpPr>
-            <a:spLocks noGrp="1"/>
-          </p:cNvSpPr>
-          <p:nvPr>
-            <p:ph idx="1"/>
-          </p:nvPr>
-        </p:nvSpPr>
-        <p:spPr/>
-        <p:txBody>
-          <a:bodyPr>
-            <a:normAutofit fontScale="92500" lnSpcReduction="20000"/>
-          </a:bodyPr>
-          <a:lstStyle/>
-          <a:p>
-            <a:r>
-              <a:rPr lang="pt-BR" dirty="0" smtClean="0"/>
-              <a:t>As folhas da árvore de decisão são os nomes das classes.</a:t>
-            </a:r>
-          </a:p>
-          <a:p>
-            <a:r>
-              <a:rPr lang="pt-BR" dirty="0" smtClean="0"/>
-              <a:t>Demais nós representam testes baseados em atributos com um ramo para cada possível resultado. </a:t>
-            </a:r>
-          </a:p>
-          <a:p>
-            <a:r>
-              <a:rPr lang="pt-BR" dirty="0" smtClean="0"/>
-              <a:t>Para classificar um objeto:</a:t>
-            </a:r>
-          </a:p>
-          <a:p>
-            <a:pPr lvl="1"/>
-            <a:r>
-              <a:rPr lang="pt-BR" dirty="0" smtClean="0"/>
-              <a:t> inicia-se pela raiz da árvore, avalia o teste, e siga o ramo de acordo com o resultado. </a:t>
-            </a:r>
-          </a:p>
-          <a:p>
-            <a:pPr lvl="1"/>
-            <a:r>
-              <a:rPr lang="pt-BR" dirty="0" smtClean="0"/>
-              <a:t>O processo continua até que a folha seja encontrada, onde o objeto é afirmado pertencer a classe com o nome da folha.</a:t>
-            </a:r>
-            <a:endParaRPr lang="pt-BR" dirty="0"/>
-          </a:p>
-        </p:txBody>
-      </p:sp>
-      <p:sp>
-        <p:nvSpPr>
-          <p:cNvPr id="5" name="Footer Placeholder 3"/>
-          <p:cNvSpPr>
-            <a:spLocks noGrp="1"/>
-          </p:cNvSpPr>
-          <p:nvPr>
-            <p:ph type="ftr" sz="quarter" idx="11"/>
-          </p:nvPr>
-        </p:nvSpPr>
-        <p:spPr>
-          <a:xfrm>
-            <a:off x="762000" y="6356350"/>
-            <a:ext cx="7086600" cy="365125"/>
-          </a:xfrm>
-        </p:spPr>
-        <p:txBody>
-          <a:bodyPr/>
-          <a:lstStyle/>
-          <a:p>
-            <a:r>
-              <a:rPr lang="pt-BR" dirty="0"/>
-              <a:t>QUINLAN, J. </a:t>
-            </a:r>
-            <a:r>
-              <a:rPr lang="pt-BR" dirty="0" err="1"/>
-              <a:t>Induction</a:t>
-            </a:r>
-            <a:r>
-              <a:rPr lang="pt-BR" dirty="0"/>
-              <a:t> </a:t>
-            </a:r>
-            <a:r>
-              <a:rPr lang="pt-BR" dirty="0" err="1"/>
-              <a:t>of</a:t>
-            </a:r>
-            <a:r>
-              <a:rPr lang="pt-BR" dirty="0"/>
-              <a:t> </a:t>
-            </a:r>
-            <a:r>
-              <a:rPr lang="pt-BR" dirty="0" err="1"/>
-              <a:t>Decision</a:t>
-            </a:r>
-            <a:r>
-              <a:rPr lang="pt-BR" dirty="0"/>
-              <a:t> </a:t>
-            </a:r>
-            <a:r>
-              <a:rPr lang="pt-BR" dirty="0" err="1"/>
-              <a:t>Trees</a:t>
-            </a:r>
-            <a:r>
-              <a:rPr lang="pt-BR" dirty="0"/>
-              <a:t>. </a:t>
-            </a:r>
-            <a:r>
-              <a:rPr lang="pt-BR" b="1" dirty="0"/>
-              <a:t>In: Machine </a:t>
-            </a:r>
-            <a:r>
-              <a:rPr lang="pt-BR" b="1" dirty="0" err="1"/>
-              <a:t>Learning</a:t>
-            </a:r>
-            <a:r>
-              <a:rPr lang="pt-BR" dirty="0"/>
-              <a:t>, v. 1, p. 81–106, 1986. </a:t>
-            </a:r>
-            <a:endParaRPr lang="en-US" dirty="0"/>
-          </a:p>
-          <a:p>
-            <a:endParaRPr lang="en-US" dirty="0"/>
-          </a:p>
-        </p:txBody>
-      </p:sp>
-      <p:sp>
-        <p:nvSpPr>
-          <p:cNvPr id="6" name="Slide Number Placeholder 5"/>
           <p:cNvSpPr>
             <a:spLocks noGrp="1"/>
           </p:cNvSpPr>
@@ -7135,6 +7445,13 @@
   <p:clrMapOvr>
     <a:masterClrMapping/>
   </p:clrMapOvr>
+  <p:timing>
+    <p:tnLst>
+      <p:par>
+        <p:cTn id="1" dur="indefinite" restart="never" nodeType="tmRoot"/>
+      </p:par>
+    </p:tnLst>
+  </p:timing>
 </p:sld>
 </file>
 
@@ -7316,6 +7633,13 @@
   <p:clrMapOvr>
     <a:masterClrMapping/>
   </p:clrMapOvr>
+  <p:timing>
+    <p:tnLst>
+      <p:par>
+        <p:cTn id="1" dur="indefinite" restart="never" nodeType="tmRoot"/>
+      </p:par>
+    </p:tnLst>
+  </p:timing>
 </p:sld>
 </file>
 
@@ -7831,315 +8155,48 @@
       </p:grpSpPr>
       <p:sp>
         <p:nvSpPr>
-          <p:cNvPr id="2" name="Title 1"/>
-          <p:cNvSpPr>
-            <a:spLocks noGrp="1"/>
-          </p:cNvSpPr>
-          <p:nvPr>
-            <p:ph type="title"/>
-          </p:nvPr>
-        </p:nvSpPr>
-        <p:spPr/>
-        <p:txBody>
-          <a:bodyPr>
-            <a:normAutofit fontScale="90000"/>
-          </a:bodyPr>
-          <a:lstStyle/>
-          <a:p>
-            <a:r>
-              <a:rPr lang="pt-BR" dirty="0"/>
+          <p:cNvPr id="6" name="Title 5"/>
+          <p:cNvSpPr>
+            <a:spLocks noGrp="1"/>
+          </p:cNvSpPr>
+          <p:nvPr>
+            <p:ph type="ctrTitle"/>
+          </p:nvPr>
+        </p:nvSpPr>
+        <p:spPr/>
+        <p:txBody>
+          <a:bodyPr/>
+          <a:lstStyle/>
+          <a:p>
+            <a:r>
+              <a:rPr lang="pt-BR" dirty="0" smtClean="0"/>
               <a:t>Árvore de Decisão para agentes BDI</a:t>
             </a:r>
-          </a:p>
-        </p:txBody>
-      </p:sp>
-      <p:sp>
-        <p:nvSpPr>
-          <p:cNvPr id="3" name="Content Placeholder 2"/>
-          <p:cNvSpPr>
-            <a:spLocks noGrp="1"/>
-          </p:cNvSpPr>
-          <p:nvPr>
-            <p:ph idx="1"/>
-          </p:nvPr>
-        </p:nvSpPr>
-        <p:spPr/>
-        <p:txBody>
-          <a:bodyPr>
-            <a:normAutofit fontScale="92500" lnSpcReduction="10000"/>
-          </a:bodyPr>
-          <a:lstStyle/>
-          <a:p>
-            <a:r>
-              <a:rPr lang="en-US" dirty="0" err="1" smtClean="0"/>
-              <a:t>Sistema</a:t>
-            </a:r>
-            <a:r>
-              <a:rPr lang="en-US" dirty="0" smtClean="0"/>
-              <a:t> </a:t>
-            </a:r>
-            <a:r>
-              <a:rPr lang="en-US" dirty="0" err="1" smtClean="0"/>
-              <a:t>visto</a:t>
-            </a:r>
-            <a:r>
-              <a:rPr lang="en-US" dirty="0" smtClean="0"/>
-              <a:t> </a:t>
-            </a:r>
-            <a:r>
-              <a:rPr lang="en-US" dirty="0" err="1" smtClean="0"/>
-              <a:t>como</a:t>
-            </a:r>
-            <a:r>
-              <a:rPr lang="en-US" dirty="0" smtClean="0"/>
-              <a:t> </a:t>
-            </a:r>
-            <a:r>
-              <a:rPr lang="en-US" dirty="0"/>
-              <a:t>um </a:t>
-            </a:r>
-            <a:r>
-              <a:rPr lang="en-US" dirty="0" err="1"/>
-              <a:t>agente</a:t>
-            </a:r>
-            <a:r>
-              <a:rPr lang="en-US" dirty="0"/>
-              <a:t> </a:t>
-            </a:r>
-            <a:r>
-              <a:rPr lang="en-US" dirty="0" err="1" smtClean="0"/>
-              <a:t>racional</a:t>
-            </a:r>
-            <a:endParaRPr lang="en-US" dirty="0" smtClean="0"/>
-          </a:p>
-          <a:p>
-            <a:pPr lvl="1"/>
-            <a:r>
-              <a:rPr lang="en-US" dirty="0" smtClean="0"/>
-              <a:t> Tem </a:t>
-            </a:r>
-            <a:r>
-              <a:rPr lang="en-US" dirty="0" err="1" smtClean="0"/>
-              <a:t>atitudes</a:t>
-            </a:r>
-            <a:r>
-              <a:rPr lang="en-US" dirty="0" smtClean="0"/>
-              <a:t> </a:t>
-            </a:r>
-            <a:r>
-              <a:rPr lang="en-US" dirty="0" err="1"/>
-              <a:t>mentais</a:t>
-            </a:r>
-            <a:r>
-              <a:rPr lang="en-US" dirty="0"/>
-              <a:t> de </a:t>
-            </a:r>
-            <a:r>
-              <a:rPr lang="en-US" dirty="0" err="1"/>
-              <a:t>crença</a:t>
-            </a:r>
-            <a:r>
-              <a:rPr lang="en-US" dirty="0"/>
-              <a:t>, </a:t>
-            </a:r>
-            <a:r>
-              <a:rPr lang="en-US" dirty="0" err="1"/>
-              <a:t>desejos</a:t>
-            </a:r>
-            <a:r>
-              <a:rPr lang="en-US" dirty="0"/>
-              <a:t> e </a:t>
-            </a:r>
-            <a:r>
-              <a:rPr lang="en-US" dirty="0" err="1"/>
-              <a:t>intenções</a:t>
-            </a:r>
-            <a:r>
-              <a:rPr lang="en-US" dirty="0"/>
-              <a:t> </a:t>
-            </a:r>
-            <a:r>
-              <a:rPr lang="en-US" dirty="0" smtClean="0"/>
-              <a:t>(BDI)</a:t>
-            </a:r>
-          </a:p>
-          <a:p>
-            <a:pPr lvl="1"/>
-            <a:endParaRPr lang="en-US" dirty="0"/>
-          </a:p>
-          <a:p>
-            <a:pPr lvl="1"/>
-            <a:r>
-              <a:rPr lang="en-US" dirty="0" err="1" smtClean="0"/>
-              <a:t>Crença</a:t>
-            </a:r>
-            <a:r>
-              <a:rPr lang="en-US" dirty="0" smtClean="0"/>
-              <a:t>:</a:t>
-            </a:r>
-          </a:p>
-          <a:p>
-            <a:pPr lvl="2"/>
-            <a:r>
-              <a:rPr lang="en-US" dirty="0" err="1" smtClean="0"/>
-              <a:t>Informação</a:t>
-            </a:r>
-            <a:r>
-              <a:rPr lang="en-US" dirty="0" smtClean="0"/>
-              <a:t> </a:t>
-            </a:r>
-            <a:r>
-              <a:rPr lang="en-US" dirty="0" err="1"/>
-              <a:t>sobre</a:t>
-            </a:r>
-            <a:r>
-              <a:rPr lang="en-US" dirty="0"/>
-              <a:t> o </a:t>
-            </a:r>
-            <a:r>
-              <a:rPr lang="en-US" dirty="0" err="1"/>
-              <a:t>estado</a:t>
-            </a:r>
-            <a:r>
-              <a:rPr lang="en-US" dirty="0"/>
-              <a:t> do </a:t>
-            </a:r>
-            <a:r>
-              <a:rPr lang="en-US" dirty="0" err="1"/>
-              <a:t>ambiente</a:t>
-            </a:r>
-            <a:r>
-              <a:rPr lang="en-US" dirty="0"/>
-              <a:t>, </a:t>
-            </a:r>
-            <a:r>
-              <a:rPr lang="en-US" dirty="0" err="1" smtClean="0"/>
-              <a:t>conhecidas</a:t>
-            </a:r>
-            <a:r>
-              <a:rPr lang="en-US" dirty="0" smtClean="0"/>
-              <a:t> </a:t>
-            </a:r>
-            <a:r>
-              <a:rPr lang="en-US" dirty="0" err="1"/>
-              <a:t>através</a:t>
-            </a:r>
-            <a:r>
-              <a:rPr lang="en-US" dirty="0"/>
-              <a:t> de </a:t>
-            </a:r>
-            <a:r>
-              <a:rPr lang="en-US" dirty="0" err="1"/>
-              <a:t>varias</a:t>
-            </a:r>
-            <a:r>
-              <a:rPr lang="en-US" dirty="0"/>
-              <a:t> "</a:t>
-            </a:r>
-            <a:r>
-              <a:rPr lang="en-US" dirty="0" err="1"/>
-              <a:t>sondagens</a:t>
-            </a:r>
-            <a:r>
-              <a:rPr lang="en-US" dirty="0"/>
-              <a:t>" do </a:t>
-            </a:r>
-            <a:r>
-              <a:rPr lang="en-US" dirty="0" err="1" smtClean="0"/>
-              <a:t>ambiente</a:t>
-            </a:r>
-            <a:endParaRPr lang="en-US" dirty="0" smtClean="0"/>
-          </a:p>
-          <a:p>
-            <a:pPr lvl="1"/>
-            <a:r>
-              <a:rPr lang="en-US" dirty="0" err="1" smtClean="0"/>
-              <a:t>Desejos</a:t>
-            </a:r>
-            <a:r>
-              <a:rPr lang="en-US" dirty="0" smtClean="0"/>
-              <a:t>:</a:t>
-            </a:r>
-          </a:p>
-          <a:p>
-            <a:pPr lvl="2"/>
-            <a:r>
-              <a:rPr lang="en-US" dirty="0" err="1" smtClean="0"/>
-              <a:t>Objetivos</a:t>
-            </a:r>
-            <a:r>
-              <a:rPr lang="en-US" dirty="0" smtClean="0"/>
-              <a:t> e/</a:t>
-            </a:r>
-            <a:r>
-              <a:rPr lang="en-US" dirty="0" err="1" smtClean="0"/>
-              <a:t>ou</a:t>
-            </a:r>
-            <a:r>
-              <a:rPr lang="en-US" dirty="0" smtClean="0"/>
-              <a:t> </a:t>
-            </a:r>
-            <a:r>
-              <a:rPr lang="en-US" dirty="0" err="1" smtClean="0"/>
-              <a:t>prioridades</a:t>
-            </a:r>
-            <a:endParaRPr lang="en-US" dirty="0" smtClean="0"/>
-          </a:p>
-          <a:p>
-            <a:pPr lvl="1"/>
-            <a:r>
-              <a:rPr lang="en-US" dirty="0" err="1" smtClean="0"/>
-              <a:t>Intenções</a:t>
-            </a:r>
-            <a:r>
-              <a:rPr lang="en-US" dirty="0" smtClean="0"/>
-              <a:t>:</a:t>
-            </a:r>
-          </a:p>
-          <a:p>
-            <a:pPr lvl="2"/>
-            <a:r>
-              <a:rPr lang="en-US" dirty="0" err="1" smtClean="0"/>
-              <a:t>representa</a:t>
-            </a:r>
-            <a:r>
-              <a:rPr lang="en-US" dirty="0" smtClean="0"/>
-              <a:t> </a:t>
-            </a:r>
-            <a:r>
-              <a:rPr lang="en-US" dirty="0"/>
-              <a:t>o </a:t>
-            </a:r>
-            <a:r>
-              <a:rPr lang="en-US" dirty="0" err="1"/>
-              <a:t>curso</a:t>
-            </a:r>
-            <a:r>
-              <a:rPr lang="en-US" dirty="0"/>
-              <a:t> de </a:t>
-            </a:r>
-            <a:r>
-              <a:rPr lang="en-US" dirty="0" err="1"/>
-              <a:t>ação</a:t>
-            </a:r>
-            <a:r>
-              <a:rPr lang="en-US" dirty="0"/>
-              <a:t> </a:t>
-            </a:r>
-            <a:r>
-              <a:rPr lang="en-US" dirty="0" err="1"/>
-              <a:t>escolhido</a:t>
-            </a:r>
-            <a:endParaRPr lang="en-US" dirty="0" smtClean="0"/>
-          </a:p>
-          <a:p>
-            <a:pPr lvl="1"/>
             <a:endParaRPr lang="pt-BR" dirty="0"/>
           </a:p>
         </p:txBody>
       </p:sp>
       <p:sp>
         <p:nvSpPr>
+          <p:cNvPr id="8" name="Subtitle 7"/>
+          <p:cNvSpPr>
+            <a:spLocks noGrp="1"/>
+          </p:cNvSpPr>
+          <p:nvPr>
+            <p:ph type="subTitle" idx="1"/>
+          </p:nvPr>
+        </p:nvSpPr>
+        <p:spPr/>
+        <p:txBody>
+          <a:bodyPr/>
+          <a:lstStyle/>
+          <a:p>
+            <a:endParaRPr lang="pt-BR"/>
+          </a:p>
+        </p:txBody>
+      </p:sp>
+      <p:sp>
+        <p:nvSpPr>
           <p:cNvPr id="4" name="Footer Placeholder 3"/>
           <p:cNvSpPr>
             <a:spLocks noGrp="1"/>
@@ -8148,36 +8205,12 @@
             <p:ph type="ftr" sz="quarter" idx="11"/>
           </p:nvPr>
         </p:nvSpPr>
-        <p:spPr>
-          <a:xfrm>
-            <a:off x="533400" y="6356350"/>
-            <a:ext cx="7772400" cy="365125"/>
-          </a:xfrm>
-        </p:spPr>
-        <p:txBody>
-          <a:bodyPr/>
-          <a:lstStyle/>
-          <a:p>
-            <a:r>
-              <a:rPr lang="en-US" dirty="0"/>
-              <a:t>RAO, A.; GEORGEFF, M. BDI-agents: from theory to practice. </a:t>
-            </a:r>
-            <a:r>
-              <a:rPr lang="en-US" b="1" dirty="0"/>
-              <a:t>In: Proceedings of the First Intl. Conference on </a:t>
-            </a:r>
-            <a:r>
-              <a:rPr lang="en-US" b="1" dirty="0" err="1"/>
-              <a:t>Multiagent</a:t>
-            </a:r>
-            <a:r>
-              <a:rPr lang="en-US" b="1" dirty="0"/>
-              <a:t> Systems</a:t>
-            </a:r>
-            <a:r>
-              <a:rPr lang="en-US" dirty="0"/>
-              <a:t>, p. 312–319, 1995.</a:t>
-            </a:r>
+        <p:spPr/>
+        <p:txBody>
+          <a:bodyPr/>
+          <a:lstStyle/>
+          <a:p>
+            <a:endParaRPr lang="en-US"/>
           </a:p>
         </p:txBody>
       </p:sp>
@@ -8230,41 +8263,318 @@
           <a:chExt cx="0" cy="0"/>
         </a:xfrm>
       </p:grpSpPr>
-      <p:pic>
-        <p:nvPicPr>
-          <p:cNvPr id="5" name="Picture 4"/>
-          <p:cNvPicPr>
-            <a:picLocks noChangeAspect="1"/>
-          </p:cNvPicPr>
-          <p:nvPr/>
-        </p:nvPicPr>
-        <p:blipFill>
-          <a:blip r:embed="rId2" cstate="print"/>
-          <a:srcRect/>
-          <a:stretch>
-            <a:fillRect/>
-          </a:stretch>
-        </p:blipFill>
-        <p:spPr bwMode="auto">
-          <a:xfrm>
-            <a:off x="990600" y="88767"/>
-            <a:ext cx="6629400" cy="6235833"/>
-          </a:xfrm>
-          <a:prstGeom prst="rect">
-            <a:avLst/>
-          </a:prstGeom>
-          <a:noFill/>
-          <a:ln w="9525">
-            <a:noFill/>
-            <a:miter lim="800000"/>
-            <a:headEnd/>
-            <a:tailEnd/>
-          </a:ln>
-        </p:spPr>
-      </p:pic>
-      <p:sp>
-        <p:nvSpPr>
-          <p:cNvPr id="6" name="Footer Placeholder 3"/>
+      <p:sp>
+        <p:nvSpPr>
+          <p:cNvPr id="2" name="Title 1"/>
+          <p:cNvSpPr>
+            <a:spLocks noGrp="1"/>
+          </p:cNvSpPr>
+          <p:nvPr>
+            <p:ph type="title"/>
+          </p:nvPr>
+        </p:nvSpPr>
+        <p:spPr/>
+        <p:txBody>
+          <a:bodyPr>
+            <a:normAutofit fontScale="90000"/>
+          </a:bodyPr>
+          <a:lstStyle/>
+          <a:p>
+            <a:r>
+              <a:rPr lang="pt-BR" dirty="0"/>
+              <a:t>Árvore de Decisão para agentes BDI</a:t>
+            </a:r>
+          </a:p>
+        </p:txBody>
+      </p:sp>
+      <p:sp>
+        <p:nvSpPr>
+          <p:cNvPr id="3" name="Content Placeholder 2"/>
+          <p:cNvSpPr>
+            <a:spLocks noGrp="1"/>
+          </p:cNvSpPr>
+          <p:nvPr>
+            <p:ph idx="1"/>
+          </p:nvPr>
+        </p:nvSpPr>
+        <p:spPr/>
+        <p:txBody>
+          <a:bodyPr>
+            <a:normAutofit fontScale="92500" lnSpcReduction="10000"/>
+          </a:bodyPr>
+          <a:lstStyle/>
+          <a:p>
+            <a:r>
+              <a:rPr lang="en-US" dirty="0" err="1" smtClean="0"/>
+              <a:t>Sistema</a:t>
+            </a:r>
+            <a:r>
+              <a:rPr lang="en-US" dirty="0" smtClean="0"/>
+              <a:t> </a:t>
+            </a:r>
+            <a:r>
+              <a:rPr lang="en-US" dirty="0" err="1" smtClean="0"/>
+              <a:t>visto</a:t>
+            </a:r>
+            <a:r>
+              <a:rPr lang="en-US" dirty="0" smtClean="0"/>
+              <a:t> </a:t>
+            </a:r>
+            <a:r>
+              <a:rPr lang="en-US" dirty="0" err="1" smtClean="0"/>
+              <a:t>como</a:t>
+            </a:r>
+            <a:r>
+              <a:rPr lang="en-US" dirty="0" smtClean="0"/>
+              <a:t> </a:t>
+            </a:r>
+            <a:r>
+              <a:rPr lang="en-US" dirty="0"/>
+              <a:t>um </a:t>
+            </a:r>
+            <a:r>
+              <a:rPr lang="en-US" dirty="0" err="1"/>
+              <a:t>agente</a:t>
+            </a:r>
+            <a:r>
+              <a:rPr lang="en-US" dirty="0"/>
+              <a:t> </a:t>
+            </a:r>
+            <a:r>
+              <a:rPr lang="en-US" dirty="0" err="1" smtClean="0"/>
+              <a:t>racional</a:t>
+            </a:r>
+            <a:endParaRPr lang="en-US" dirty="0" smtClean="0"/>
+          </a:p>
+          <a:p>
+            <a:pPr lvl="1"/>
+            <a:r>
+              <a:rPr lang="en-US" dirty="0" smtClean="0"/>
+              <a:t> Tem </a:t>
+            </a:r>
+            <a:r>
+              <a:rPr lang="en-US" dirty="0" err="1" smtClean="0"/>
+              <a:t>atitudes</a:t>
+            </a:r>
+            <a:r>
+              <a:rPr lang="en-US" dirty="0" smtClean="0"/>
+              <a:t> </a:t>
+            </a:r>
+            <a:r>
+              <a:rPr lang="en-US" dirty="0" err="1"/>
+              <a:t>mentais</a:t>
+            </a:r>
+            <a:r>
+              <a:rPr lang="en-US" dirty="0"/>
+              <a:t> de </a:t>
+            </a:r>
+            <a:r>
+              <a:rPr lang="en-US" dirty="0" err="1"/>
+              <a:t>crença</a:t>
+            </a:r>
+            <a:r>
+              <a:rPr lang="en-US" dirty="0"/>
+              <a:t>, </a:t>
+            </a:r>
+            <a:r>
+              <a:rPr lang="en-US" dirty="0" err="1"/>
+              <a:t>desejos</a:t>
+            </a:r>
+            <a:r>
+              <a:rPr lang="en-US" dirty="0"/>
+              <a:t> e </a:t>
+            </a:r>
+            <a:r>
+              <a:rPr lang="en-US" dirty="0" err="1"/>
+              <a:t>intenções</a:t>
+            </a:r>
+            <a:r>
+              <a:rPr lang="en-US" dirty="0"/>
+              <a:t> </a:t>
+            </a:r>
+            <a:r>
+              <a:rPr lang="en-US" dirty="0" smtClean="0"/>
+              <a:t>(BDI)</a:t>
+            </a:r>
+          </a:p>
+          <a:p>
+            <a:pPr lvl="1"/>
+            <a:endParaRPr lang="en-US" dirty="0"/>
+          </a:p>
+          <a:p>
+            <a:pPr lvl="1"/>
+            <a:r>
+              <a:rPr lang="en-US" dirty="0" err="1" smtClean="0"/>
+              <a:t>Crença</a:t>
+            </a:r>
+            <a:r>
+              <a:rPr lang="en-US" dirty="0" smtClean="0"/>
+              <a:t>:</a:t>
+            </a:r>
+          </a:p>
+          <a:p>
+            <a:pPr lvl="2"/>
+            <a:r>
+              <a:rPr lang="en-US" dirty="0" err="1" smtClean="0"/>
+              <a:t>Informação</a:t>
+            </a:r>
+            <a:r>
+              <a:rPr lang="en-US" dirty="0" smtClean="0"/>
+              <a:t> </a:t>
+            </a:r>
+            <a:r>
+              <a:rPr lang="en-US" dirty="0" err="1"/>
+              <a:t>sobre</a:t>
+            </a:r>
+            <a:r>
+              <a:rPr lang="en-US" dirty="0"/>
+              <a:t> o </a:t>
+            </a:r>
+            <a:r>
+              <a:rPr lang="en-US" dirty="0" err="1"/>
+              <a:t>estado</a:t>
+            </a:r>
+            <a:r>
+              <a:rPr lang="en-US" dirty="0"/>
+              <a:t> do </a:t>
+            </a:r>
+            <a:r>
+              <a:rPr lang="en-US" dirty="0" err="1"/>
+              <a:t>ambiente</a:t>
+            </a:r>
+            <a:r>
+              <a:rPr lang="en-US" dirty="0"/>
+              <a:t>, </a:t>
+            </a:r>
+            <a:r>
+              <a:rPr lang="en-US" dirty="0" err="1" smtClean="0"/>
+              <a:t>conhecidas</a:t>
+            </a:r>
+            <a:r>
+              <a:rPr lang="en-US" dirty="0" smtClean="0"/>
+              <a:t> </a:t>
+            </a:r>
+            <a:r>
+              <a:rPr lang="en-US" dirty="0" err="1"/>
+              <a:t>através</a:t>
+            </a:r>
+            <a:r>
+              <a:rPr lang="en-US" dirty="0"/>
+              <a:t> de </a:t>
+            </a:r>
+            <a:r>
+              <a:rPr lang="en-US" dirty="0" err="1"/>
+              <a:t>varias</a:t>
+            </a:r>
+            <a:r>
+              <a:rPr lang="en-US" dirty="0"/>
+              <a:t> "</a:t>
+            </a:r>
+            <a:r>
+              <a:rPr lang="en-US" dirty="0" err="1"/>
+              <a:t>sondagens</a:t>
+            </a:r>
+            <a:r>
+              <a:rPr lang="en-US" dirty="0"/>
+              <a:t>" do </a:t>
+            </a:r>
+            <a:r>
+              <a:rPr lang="en-US" dirty="0" err="1" smtClean="0"/>
+              <a:t>ambiente</a:t>
+            </a:r>
+            <a:endParaRPr lang="en-US" dirty="0" smtClean="0"/>
+          </a:p>
+          <a:p>
+            <a:pPr lvl="1"/>
+            <a:r>
+              <a:rPr lang="en-US" dirty="0" err="1" smtClean="0"/>
+              <a:t>Desejos</a:t>
+            </a:r>
+            <a:r>
+              <a:rPr lang="en-US" dirty="0" smtClean="0"/>
+              <a:t>:</a:t>
+            </a:r>
+          </a:p>
+          <a:p>
+            <a:pPr lvl="2"/>
+            <a:r>
+              <a:rPr lang="en-US" dirty="0" err="1" smtClean="0"/>
+              <a:t>Objetivos</a:t>
+            </a:r>
+            <a:r>
+              <a:rPr lang="en-US" dirty="0" smtClean="0"/>
+              <a:t> e/</a:t>
+            </a:r>
+            <a:r>
+              <a:rPr lang="en-US" dirty="0" err="1" smtClean="0"/>
+              <a:t>ou</a:t>
+            </a:r>
+            <a:r>
+              <a:rPr lang="en-US" dirty="0" smtClean="0"/>
+              <a:t> </a:t>
+            </a:r>
+            <a:r>
+              <a:rPr lang="en-US" dirty="0" err="1" smtClean="0"/>
+              <a:t>prioridades</a:t>
+            </a:r>
+            <a:endParaRPr lang="en-US" dirty="0" smtClean="0"/>
+          </a:p>
+          <a:p>
+            <a:pPr lvl="1"/>
+            <a:r>
+              <a:rPr lang="en-US" dirty="0" err="1" smtClean="0"/>
+              <a:t>Intenções</a:t>
+            </a:r>
+            <a:r>
+              <a:rPr lang="en-US" dirty="0" smtClean="0"/>
+              <a:t>:</a:t>
+            </a:r>
+          </a:p>
+          <a:p>
+            <a:pPr lvl="2"/>
+            <a:r>
+              <a:rPr lang="en-US" dirty="0" err="1" smtClean="0"/>
+              <a:t>representa</a:t>
+            </a:r>
+            <a:r>
+              <a:rPr lang="en-US" dirty="0" smtClean="0"/>
+              <a:t> </a:t>
+            </a:r>
+            <a:r>
+              <a:rPr lang="en-US" dirty="0"/>
+              <a:t>o </a:t>
+            </a:r>
+            <a:r>
+              <a:rPr lang="en-US" dirty="0" err="1"/>
+              <a:t>curso</a:t>
+            </a:r>
+            <a:r>
+              <a:rPr lang="en-US" dirty="0"/>
+              <a:t> de </a:t>
+            </a:r>
+            <a:r>
+              <a:rPr lang="en-US" dirty="0" err="1"/>
+              <a:t>ação</a:t>
+            </a:r>
+            <a:r>
+              <a:rPr lang="en-US" dirty="0"/>
+              <a:t> </a:t>
+            </a:r>
+            <a:r>
+              <a:rPr lang="en-US" dirty="0" err="1"/>
+              <a:t>escolhido</a:t>
+            </a:r>
+            <a:endParaRPr lang="en-US" dirty="0" smtClean="0"/>
+          </a:p>
+          <a:p>
+            <a:pPr lvl="1"/>
+            <a:endParaRPr lang="pt-BR" dirty="0"/>
+          </a:p>
+        </p:txBody>
+      </p:sp>
+      <p:sp>
+        <p:nvSpPr>
+          <p:cNvPr id="4" name="Footer Placeholder 3"/>
           <p:cNvSpPr>
             <a:spLocks noGrp="1"/>
           </p:cNvSpPr>
@@ -8307,7 +8617,7 @@
       </p:sp>
       <p:sp>
         <p:nvSpPr>
-          <p:cNvPr id="7" name="Slide Number Placeholder 6"/>
+          <p:cNvPr id="5" name="Slide Number Placeholder 4"/>
           <p:cNvSpPr>
             <a:spLocks noGrp="1"/>
           </p:cNvSpPr>
@@ -8334,13 +8644,6 @@
   <p:clrMapOvr>
     <a:masterClrMapping/>
   </p:clrMapOvr>
-  <p:timing>
-    <p:tnLst>
-      <p:par>
-        <p:cTn id="1" dur="indefinite" restart="never" nodeType="tmRoot"/>
-      </p:par>
-    </p:tnLst>
-  </p:timing>
 </p:sld>
 </file>
 
@@ -8363,7 +8666,91 @@
       </p:grpSpPr>
       <p:sp>
         <p:nvSpPr>
-          <p:cNvPr id="5" name="Footer Placeholder 3"/>
+          <p:cNvPr id="2" name="Title 1"/>
+          <p:cNvSpPr>
+            <a:spLocks noGrp="1"/>
+          </p:cNvSpPr>
+          <p:nvPr>
+            <p:ph type="title"/>
+          </p:nvPr>
+        </p:nvSpPr>
+        <p:spPr/>
+        <p:txBody>
+          <a:bodyPr/>
+          <a:lstStyle/>
+          <a:p>
+            <a:r>
+              <a:rPr lang="pt-BR" dirty="0" smtClean="0"/>
+              <a:t>Transformação: Crença</a:t>
+            </a:r>
+            <a:endParaRPr lang="pt-BR" dirty="0"/>
+          </a:p>
+        </p:txBody>
+      </p:sp>
+      <p:sp>
+        <p:nvSpPr>
+          <p:cNvPr id="3" name="Content Placeholder 2"/>
+          <p:cNvSpPr>
+            <a:spLocks noGrp="1"/>
+          </p:cNvSpPr>
+          <p:nvPr>
+            <p:ph idx="1"/>
+          </p:nvPr>
+        </p:nvSpPr>
+        <p:spPr/>
+        <p:txBody>
+          <a:bodyPr/>
+          <a:lstStyle/>
+          <a:p>
+            <a:r>
+              <a:rPr lang="pt-BR" dirty="0" smtClean="0"/>
+              <a:t>Dada a árvore de decisão fazer:</a:t>
+            </a:r>
+          </a:p>
+          <a:p>
+            <a:pPr lvl="1"/>
+            <a:r>
+              <a:rPr lang="pt-BR" dirty="0" smtClean="0"/>
+              <a:t>Para cada nó de incerteza:</a:t>
+            </a:r>
+          </a:p>
+          <a:p>
+            <a:pPr lvl="2"/>
+            <a:r>
+              <a:rPr lang="pt-BR" dirty="0" smtClean="0"/>
+              <a:t>Duplique a arvore com a seguinte alteração:</a:t>
+            </a:r>
+          </a:p>
+          <a:p>
+            <a:pPr lvl="3"/>
+            <a:r>
+              <a:rPr lang="pt-BR" dirty="0" smtClean="0"/>
+              <a:t>Para cada ramificação, remova o nó e ligue o sucessor com antecessor.</a:t>
+            </a:r>
+          </a:p>
+          <a:p>
+            <a:pPr lvl="1"/>
+            <a:r>
+              <a:rPr lang="pt-BR" dirty="0" smtClean="0"/>
+              <a:t>Repita até não ter nó de incerteza</a:t>
+            </a:r>
+          </a:p>
+          <a:p>
+            <a:pPr lvl="1"/>
+            <a:endParaRPr lang="pt-BR" dirty="0" smtClean="0"/>
+          </a:p>
+          <a:p>
+            <a:r>
+              <a:rPr lang="pt-BR" dirty="0" smtClean="0"/>
+              <a:t>Resultado: Árvores de decisão de Crença</a:t>
+            </a:r>
+            <a:endParaRPr lang="pt-BR" dirty="0"/>
+          </a:p>
+        </p:txBody>
+      </p:sp>
+      <p:sp>
+        <p:nvSpPr>
+          <p:cNvPr id="4" name="Footer Placeholder 3"/>
           <p:cNvSpPr>
             <a:spLocks noGrp="1"/>
           </p:cNvSpPr>
@@ -8371,74 +8758,18 @@
             <p:ph type="ftr" sz="quarter" idx="11"/>
           </p:nvPr>
         </p:nvSpPr>
-        <p:spPr>
-          <a:xfrm>
-            <a:off x="533400" y="6356350"/>
-            <a:ext cx="7772400" cy="365125"/>
-          </a:xfrm>
-        </p:spPr>
-        <p:txBody>
-          <a:bodyPr/>
-          <a:lstStyle/>
-          <a:p>
-            <a:r>
-              <a:rPr lang="en-US" dirty="0"/>
-              <a:t>RAO, A.; GEORGEFF, M. BDI-agents: from theory to practice. </a:t>
-            </a:r>
-            <a:r>
-              <a:rPr lang="en-US" b="1" dirty="0"/>
-              <a:t>In: Proceedings of the First Intl. Conference on </a:t>
-            </a:r>
-            <a:r>
-              <a:rPr lang="en-US" b="1" dirty="0" err="1"/>
-              <a:t>Multiagent</a:t>
-            </a:r>
-            <a:r>
-              <a:rPr lang="en-US" b="1" dirty="0"/>
-              <a:t> Systems</a:t>
-            </a:r>
-            <a:r>
-              <a:rPr lang="en-US" dirty="0"/>
-              <a:t>, p. 312–319, 1995.</a:t>
-            </a:r>
-          </a:p>
-        </p:txBody>
-      </p:sp>
-      <p:pic>
-        <p:nvPicPr>
-          <p:cNvPr id="6" name="Picture 5"/>
-          <p:cNvPicPr>
-            <a:picLocks noChangeAspect="1"/>
-          </p:cNvPicPr>
-          <p:nvPr/>
-        </p:nvPicPr>
-        <p:blipFill>
-          <a:blip r:embed="rId2" cstate="print"/>
-          <a:srcRect/>
-          <a:stretch>
-            <a:fillRect/>
-          </a:stretch>
-        </p:blipFill>
-        <p:spPr bwMode="auto">
-          <a:xfrm>
-            <a:off x="609600" y="304800"/>
-            <a:ext cx="7924800" cy="5960709"/>
-          </a:xfrm>
-          <a:prstGeom prst="rect">
-            <a:avLst/>
-          </a:prstGeom>
-          <a:noFill/>
-          <a:ln w="9525">
-            <a:noFill/>
-            <a:miter lim="800000"/>
-            <a:headEnd/>
-            <a:tailEnd/>
-          </a:ln>
-        </p:spPr>
-      </p:pic>
-      <p:sp>
-        <p:nvSpPr>
-          <p:cNvPr id="7" name="Slide Number Placeholder 6"/>
+        <p:spPr/>
+        <p:txBody>
+          <a:bodyPr/>
+          <a:lstStyle/>
+          <a:p>
+            <a:endParaRPr lang="en-US"/>
+          </a:p>
+        </p:txBody>
+      </p:sp>
+      <p:sp>
+        <p:nvSpPr>
+          <p:cNvPr id="5" name="Slide Number Placeholder 4"/>
           <p:cNvSpPr>
             <a:spLocks noGrp="1"/>
           </p:cNvSpPr>
@@ -8465,13 +8796,6 @@
   <p:clrMapOvr>
     <a:masterClrMapping/>
   </p:clrMapOvr>
-  <p:timing>
-    <p:tnLst>
-      <p:par>
-        <p:cTn id="1" dur="indefinite" restart="never" nodeType="tmRoot"/>
-      </p:par>
-    </p:tnLst>
-  </p:timing>
 </p:sld>
 </file>
 
@@ -8499,59 +8823,73 @@
             <a:spLocks noGrp="1"/>
           </p:cNvSpPr>
           <p:nvPr>
-            <p:ph type="ctrTitle"/>
-          </p:nvPr>
-        </p:nvSpPr>
-        <p:spPr/>
-        <p:txBody>
-          <a:bodyPr>
-            <a:normAutofit fontScale="90000"/>
-          </a:bodyPr>
-          <a:lstStyle/>
-          <a:p>
-            <a:r>
-              <a:rPr lang="pt-BR" dirty="0" smtClean="0"/>
-              <a:t>Raciocínio</a:t>
-            </a:r>
-            <a:br>
-              <a:rPr lang="pt-BR" dirty="0" smtClean="0"/>
-            </a:br>
-            <a:r>
-              <a:rPr lang="pt-BR" dirty="0" smtClean="0"/>
-              <a:t>Introdução a Sistemas Multiagentes</a:t>
-            </a:r>
-            <a:endParaRPr lang="en-US" dirty="0"/>
-          </a:p>
-        </p:txBody>
-      </p:sp>
-      <p:sp>
-        <p:nvSpPr>
-          <p:cNvPr id="3" name="Subtitle 2"/>
-          <p:cNvSpPr>
-            <a:spLocks noGrp="1"/>
-          </p:cNvSpPr>
-          <p:nvPr>
-            <p:ph type="subTitle" idx="1"/>
-          </p:nvPr>
-        </p:nvSpPr>
-        <p:spPr/>
-        <p:txBody>
-          <a:bodyPr/>
-          <a:lstStyle/>
-          <a:p>
-            <a:r>
-              <a:rPr lang="pt-BR" dirty="0" err="1"/>
-              <a:t>Troy</a:t>
-            </a:r>
-            <a:r>
-              <a:rPr lang="pt-BR" dirty="0"/>
-              <a:t> C </a:t>
-            </a:r>
-            <a:r>
-              <a:rPr lang="pt-BR" dirty="0" err="1"/>
-              <a:t>Kohwalter</a:t>
-            </a:r>
-            <a:endParaRPr lang="en-US" dirty="0"/>
+            <p:ph type="title"/>
+          </p:nvPr>
+        </p:nvSpPr>
+        <p:spPr/>
+        <p:txBody>
+          <a:bodyPr/>
+          <a:lstStyle/>
+          <a:p>
+            <a:r>
+              <a:rPr lang="pt-BR" dirty="0" smtClean="0"/>
+              <a:t>Transformação: Desejo, Intenção</a:t>
+            </a:r>
+            <a:endParaRPr lang="pt-BR" dirty="0"/>
+          </a:p>
+        </p:txBody>
+      </p:sp>
+      <p:sp>
+        <p:nvSpPr>
+          <p:cNvPr id="3" name="Content Placeholder 2"/>
+          <p:cNvSpPr>
+            <a:spLocks noGrp="1"/>
+          </p:cNvSpPr>
+          <p:nvPr>
+            <p:ph idx="1"/>
+          </p:nvPr>
+        </p:nvSpPr>
+        <p:spPr/>
+        <p:txBody>
+          <a:bodyPr/>
+          <a:lstStyle/>
+          <a:p>
+            <a:r>
+              <a:rPr lang="pt-BR" dirty="0" smtClean="0"/>
+              <a:t>Desejo:</a:t>
+            </a:r>
+          </a:p>
+          <a:p>
+            <a:pPr lvl="1"/>
+            <a:r>
+              <a:rPr lang="pt-BR" dirty="0" smtClean="0"/>
+              <a:t>Dada as árvores de Crença:</a:t>
+            </a:r>
+          </a:p>
+          <a:p>
+            <a:pPr lvl="2"/>
+            <a:r>
+              <a:rPr lang="pt-BR" dirty="0" smtClean="0"/>
+              <a:t>Remova os ramos que não deseja seguir</a:t>
+            </a:r>
+          </a:p>
+          <a:p>
+            <a:pPr lvl="1"/>
+            <a:endParaRPr lang="pt-BR" dirty="0" smtClean="0"/>
+          </a:p>
+          <a:p>
+            <a:r>
+              <a:rPr lang="pt-BR" dirty="0" smtClean="0"/>
+              <a:t>Intenção:</a:t>
+            </a:r>
+          </a:p>
+          <a:p>
+            <a:pPr lvl="1"/>
+            <a:r>
+              <a:rPr lang="pt-BR" dirty="0" smtClean="0"/>
+              <a:t>Possíveis caminhos da árvore de Crença</a:t>
+            </a:r>
+            <a:endParaRPr lang="pt-BR" dirty="0"/>
           </a:p>
         </p:txBody>
       </p:sp>
@@ -8570,6 +8908,30 @@
           <a:bodyPr/>
           <a:lstStyle/>
           <a:p>
+            <a:endParaRPr lang="en-US"/>
+          </a:p>
+        </p:txBody>
+      </p:sp>
+      <p:sp>
+        <p:nvSpPr>
+          <p:cNvPr id="5" name="Slide Number Placeholder 4"/>
+          <p:cNvSpPr>
+            <a:spLocks noGrp="1"/>
+          </p:cNvSpPr>
+          <p:nvPr>
+            <p:ph type="sldNum" sz="quarter" idx="12"/>
+          </p:nvPr>
+        </p:nvSpPr>
+        <p:spPr/>
+        <p:txBody>
+          <a:bodyPr/>
+          <a:lstStyle/>
+          <a:p>
+            <a:fld id="{C2596E1E-EB91-4095-BA0D-C3A644609A86}" type="slidenum">
+              <a:rPr lang="en-US" smtClean="0"/>
+              <a:pPr/>
+              <a:t>29</a:t>
+            </a:fld>
             <a:endParaRPr lang="en-US"/>
           </a:p>
         </p:txBody>
@@ -8579,13 +8941,6 @@
   <p:clrMapOvr>
     <a:masterClrMapping/>
   </p:clrMapOvr>
-  <p:timing>
-    <p:tnLst>
-      <p:par>
-        <p:cTn id="1" dur="indefinite" restart="never" nodeType="tmRoot"/>
-      </p:par>
-    </p:tnLst>
-  </p:timing>
 </p:sld>
 </file>
 
@@ -8740,127 +9095,41 @@
           <a:chExt cx="0" cy="0"/>
         </a:xfrm>
       </p:grpSpPr>
-      <p:sp>
-        <p:nvSpPr>
-          <p:cNvPr id="2" name="Title 1"/>
-          <p:cNvSpPr>
-            <a:spLocks noGrp="1"/>
-          </p:cNvSpPr>
-          <p:nvPr>
-            <p:ph type="title"/>
-          </p:nvPr>
-        </p:nvSpPr>
-        <p:spPr/>
-        <p:txBody>
-          <a:bodyPr>
-            <a:normAutofit/>
-          </a:bodyPr>
-          <a:lstStyle/>
-          <a:p>
-            <a:r>
-              <a:rPr lang="pt-BR" dirty="0"/>
-              <a:t>Software </a:t>
-            </a:r>
-            <a:r>
-              <a:rPr lang="pt-BR" dirty="0" err="1"/>
-              <a:t>Development</a:t>
-            </a:r>
-            <a:r>
-              <a:rPr lang="pt-BR" dirty="0"/>
-              <a:t> </a:t>
-            </a:r>
-            <a:r>
-              <a:rPr lang="pt-BR" dirty="0" smtClean="0"/>
-              <a:t>Manager</a:t>
-            </a:r>
-            <a:endParaRPr lang="pt-BR" dirty="0"/>
-          </a:p>
-        </p:txBody>
-      </p:sp>
-      <p:sp>
-        <p:nvSpPr>
-          <p:cNvPr id="3" name="Content Placeholder 2"/>
-          <p:cNvSpPr>
-            <a:spLocks noGrp="1"/>
-          </p:cNvSpPr>
-          <p:nvPr>
-            <p:ph idx="1"/>
-          </p:nvPr>
-        </p:nvSpPr>
-        <p:spPr/>
-        <p:txBody>
-          <a:bodyPr>
-            <a:normAutofit/>
-          </a:bodyPr>
-          <a:lstStyle/>
-          <a:p>
-            <a:r>
-              <a:rPr lang="pt-BR" dirty="0" smtClean="0"/>
-              <a:t>Jogador</a:t>
-            </a:r>
-          </a:p>
-          <a:p>
-            <a:pPr lvl="1"/>
-            <a:r>
-              <a:rPr lang="pt-BR" dirty="0" smtClean="0"/>
-              <a:t>Ambiente de trabalho</a:t>
-            </a:r>
-          </a:p>
-          <a:p>
-            <a:pPr lvl="1"/>
-            <a:r>
-              <a:rPr lang="pt-BR" dirty="0" smtClean="0"/>
-              <a:t>Equipe</a:t>
-            </a:r>
-          </a:p>
-          <a:p>
-            <a:pPr lvl="2"/>
-            <a:r>
-              <a:rPr lang="pt-BR" dirty="0" err="1" smtClean="0"/>
-              <a:t>Funcionarios</a:t>
-            </a:r>
-            <a:endParaRPr lang="pt-BR" dirty="0" smtClean="0"/>
-          </a:p>
-          <a:p>
-            <a:pPr lvl="3"/>
-            <a:r>
-              <a:rPr lang="pt-BR" dirty="0" smtClean="0"/>
-              <a:t>Atributos</a:t>
-            </a:r>
-          </a:p>
-          <a:p>
-            <a:pPr lvl="3"/>
-            <a:r>
-              <a:rPr lang="pt-BR" dirty="0" smtClean="0"/>
-              <a:t>Especializações</a:t>
-            </a:r>
-          </a:p>
-          <a:p>
-            <a:pPr lvl="3"/>
-            <a:r>
-              <a:rPr lang="pt-BR" dirty="0" smtClean="0"/>
-              <a:t>Papeis</a:t>
-            </a:r>
-          </a:p>
-          <a:p>
-            <a:pPr lvl="1"/>
-            <a:r>
-              <a:rPr lang="pt-BR" dirty="0" smtClean="0"/>
-              <a:t>Desenvolve Softwares</a:t>
-            </a:r>
-          </a:p>
-          <a:p>
-            <a:pPr lvl="2"/>
-            <a:r>
-              <a:rPr lang="pt-BR" dirty="0" smtClean="0"/>
-              <a:t>Segue os requisitos do cliente</a:t>
-            </a:r>
-          </a:p>
-        </p:txBody>
-      </p:sp>
-      <p:sp>
-        <p:nvSpPr>
-          <p:cNvPr id="4" name="Footer Placeholder 3"/>
+      <p:pic>
+        <p:nvPicPr>
+          <p:cNvPr id="5" name="Picture 4"/>
+          <p:cNvPicPr>
+            <a:picLocks noChangeAspect="1"/>
+          </p:cNvPicPr>
+          <p:nvPr/>
+        </p:nvPicPr>
+        <p:blipFill>
+          <a:blip r:embed="rId3" cstate="print"/>
+          <a:srcRect/>
+          <a:stretch>
+            <a:fillRect/>
+          </a:stretch>
+        </p:blipFill>
+        <p:spPr bwMode="auto">
+          <a:xfrm>
+            <a:off x="228600" y="76200"/>
+            <a:ext cx="6629400" cy="6235833"/>
+          </a:xfrm>
+          <a:prstGeom prst="rect">
+            <a:avLst/>
+          </a:prstGeom>
+          <a:noFill/>
+          <a:ln w="9525">
+            <a:noFill/>
+            <a:miter lim="800000"/>
+            <a:headEnd/>
+            <a:tailEnd/>
+          </a:ln>
+        </p:spPr>
+      </p:pic>
+      <p:sp>
+        <p:nvSpPr>
+          <p:cNvPr id="6" name="Footer Placeholder 3"/>
           <p:cNvSpPr>
             <a:spLocks noGrp="1"/>
           </p:cNvSpPr>
@@ -8870,8 +9139,8 @@
         </p:nvSpPr>
         <p:spPr>
           <a:xfrm>
-            <a:off x="457200" y="6356350"/>
-            <a:ext cx="8001000" cy="365125"/>
+            <a:off x="533400" y="6356350"/>
+            <a:ext cx="7772400" cy="365125"/>
           </a:xfrm>
         </p:spPr>
         <p:txBody>
@@ -8879,61 +9148,31 @@
           <a:lstStyle/>
           <a:p>
             <a:r>
-              <a:rPr lang="pt-BR" dirty="0"/>
-              <a:t>KOHWALTER, T.; CLUA, E.; MURTA, L. </a:t>
-            </a:r>
-            <a:r>
-              <a:rPr lang="pt-BR" b="1" dirty="0"/>
-              <a:t>SDM – </a:t>
-            </a:r>
-            <a:r>
-              <a:rPr lang="pt-BR" b="1" dirty="0" err="1"/>
-              <a:t>An</a:t>
-            </a:r>
-            <a:r>
-              <a:rPr lang="pt-BR" b="1" dirty="0"/>
-              <a:t> </a:t>
-            </a:r>
-            <a:r>
-              <a:rPr lang="pt-BR" b="1" dirty="0" err="1"/>
-              <a:t>Educational</a:t>
-            </a:r>
-            <a:r>
-              <a:rPr lang="pt-BR" b="1" dirty="0"/>
-              <a:t> Game for Software </a:t>
-            </a:r>
-            <a:r>
-              <a:rPr lang="pt-BR" b="1" dirty="0" err="1"/>
-              <a:t>Engineering</a:t>
-            </a:r>
-            <a:r>
-              <a:rPr lang="pt-BR" dirty="0"/>
-              <a:t>. . Salvador: In: X </a:t>
-            </a:r>
-            <a:r>
-              <a:rPr lang="pt-BR" dirty="0" err="1"/>
-              <a:t>SBGames</a:t>
-            </a:r>
-            <a:r>
-              <a:rPr lang="pt-BR" dirty="0"/>
-              <a:t>. , 2011</a:t>
-            </a:r>
-            <a:endParaRPr lang="en-US" dirty="0"/>
-          </a:p>
-          <a:p>
-            <a:r>
-              <a:rPr lang="en-US" dirty="0" smtClean="0">
-                <a:hlinkClick r:id="rId2"/>
-              </a:rPr>
-              <a:t>http://www.ic.uff.br/~tkohwalter/sdm/</a:t>
-            </a:r>
-            <a:endParaRPr lang="en-US" dirty="0"/>
-          </a:p>
-        </p:txBody>
-      </p:sp>
-      <p:sp>
-        <p:nvSpPr>
-          <p:cNvPr id="5" name="Slide Number Placeholder 4"/>
+              <a:rPr lang="en-US" dirty="0"/>
+              <a:t>RAO, A.; GEORGEFF, M. BDI-agents: from theory to practice. </a:t>
+            </a:r>
+            <a:r>
+              <a:rPr lang="en-US" b="1" dirty="0"/>
+              <a:t>In: Proceedings of the First Intl. Conference on </a:t>
+            </a:r>
+            <a:r>
+              <a:rPr lang="en-US" b="1" dirty="0" err="1"/>
+              <a:t>Multiagent</a:t>
+            </a:r>
+            <a:r>
+              <a:rPr lang="en-US" b="1" dirty="0"/>
+              <a:t> Systems</a:t>
+            </a:r>
+            <a:r>
+              <a:rPr lang="en-US" dirty="0"/>
+              <a:t>, p. 312–319, 1995.</a:t>
+            </a:r>
+          </a:p>
+        </p:txBody>
+      </p:sp>
+      <p:sp>
+        <p:nvSpPr>
+          <p:cNvPr id="7" name="Slide Number Placeholder 6"/>
           <p:cNvSpPr>
             <a:spLocks noGrp="1"/>
           </p:cNvSpPr>
@@ -8951,7 +9190,114 @@
               <a:pPr/>
               <a:t>30</a:t>
             </a:fld>
-            <a:endParaRPr lang="en-US" dirty="0"/>
+            <a:endParaRPr lang="en-US"/>
+          </a:p>
+        </p:txBody>
+      </p:sp>
+      <p:sp>
+        <p:nvSpPr>
+          <p:cNvPr id="8" name="TextBox 7"/>
+          <p:cNvSpPr txBox="1"/>
+          <p:nvPr/>
+        </p:nvSpPr>
+        <p:spPr>
+          <a:xfrm>
+            <a:off x="6985845" y="533400"/>
+            <a:ext cx="2158155" cy="2585323"/>
+          </a:xfrm>
+          <a:prstGeom prst="rect">
+            <a:avLst/>
+          </a:prstGeom>
+          <a:noFill/>
+        </p:spPr>
+        <p:txBody>
+          <a:bodyPr wrap="none" rtlCol="0">
+            <a:spAutoFit/>
+          </a:bodyPr>
+          <a:lstStyle/>
+          <a:p>
+            <a:pPr>
+              <a:buFont typeface="Arial" pitchFamily="34" charset="0"/>
+              <a:buChar char="•"/>
+            </a:pPr>
+            <a:r>
+              <a:rPr lang="pt-BR" dirty="0" smtClean="0"/>
+              <a:t>Exemplo: Phil</a:t>
+            </a:r>
+          </a:p>
+          <a:p>
+            <a:pPr>
+              <a:buFont typeface="Arial" pitchFamily="34" charset="0"/>
+              <a:buChar char="•"/>
+            </a:pPr>
+            <a:endParaRPr lang="pt-BR" dirty="0" smtClean="0"/>
+          </a:p>
+          <a:p>
+            <a:pPr>
+              <a:buFont typeface="Arial" pitchFamily="34" charset="0"/>
+              <a:buChar char="•"/>
+            </a:pPr>
+            <a:r>
+              <a:rPr lang="pt-BR" dirty="0" smtClean="0"/>
+              <a:t>Terminais:</a:t>
+            </a:r>
+          </a:p>
+          <a:p>
+            <a:pPr lvl="1">
+              <a:buFont typeface="Arial" pitchFamily="34" charset="0"/>
+              <a:buChar char="•"/>
+            </a:pPr>
+            <a:r>
+              <a:rPr lang="pt-BR" dirty="0" smtClean="0"/>
+              <a:t>Representante</a:t>
+            </a:r>
+          </a:p>
+          <a:p>
+            <a:pPr lvl="1">
+              <a:buFont typeface="Arial" pitchFamily="34" charset="0"/>
+              <a:buChar char="•"/>
+            </a:pPr>
+            <a:r>
+              <a:rPr lang="pt-BR" dirty="0" smtClean="0"/>
+              <a:t>Senador</a:t>
+            </a:r>
+          </a:p>
+          <a:p>
+            <a:pPr lvl="1">
+              <a:buFont typeface="Arial" pitchFamily="34" charset="0"/>
+              <a:buChar char="•"/>
+            </a:pPr>
+            <a:r>
+              <a:rPr lang="pt-BR" dirty="0" smtClean="0"/>
+              <a:t>Aposentar</a:t>
+            </a:r>
+          </a:p>
+          <a:p>
+            <a:pPr>
+              <a:buFont typeface="Arial" pitchFamily="34" charset="0"/>
+              <a:buChar char="•"/>
+            </a:pPr>
+            <a:endParaRPr lang="pt-BR" dirty="0" smtClean="0"/>
+          </a:p>
+          <a:p>
+            <a:pPr>
+              <a:buFont typeface="Arial" pitchFamily="34" charset="0"/>
+              <a:buChar char="•"/>
+            </a:pPr>
+            <a:r>
+              <a:rPr lang="pt-BR" dirty="0" smtClean="0"/>
+              <a:t>Pesquisa de Opinião</a:t>
+            </a:r>
+          </a:p>
+          <a:p>
+            <a:pPr lvl="1">
+              <a:buFont typeface="Arial" pitchFamily="34" charset="0"/>
+              <a:buChar char="•"/>
+            </a:pPr>
+            <a:r>
+              <a:rPr lang="pt-BR" dirty="0" smtClean="0"/>
+              <a:t>Majoritário</a:t>
+            </a:r>
           </a:p>
         </p:txBody>
       </p:sp>
@@ -8960,6 +9306,13 @@
   <p:clrMapOvr>
     <a:masterClrMapping/>
   </p:clrMapOvr>
+  <p:timing>
+    <p:tnLst>
+      <p:par>
+        <p:cTn id="1" dur="indefinite" restart="never" nodeType="tmRoot"/>
+      </p:par>
+    </p:tnLst>
+  </p:timing>
 </p:sld>
 </file>
 
@@ -8982,6 +9335,403 @@
       </p:grpSpPr>
       <p:sp>
         <p:nvSpPr>
+          <p:cNvPr id="5" name="Footer Placeholder 3"/>
+          <p:cNvSpPr>
+            <a:spLocks noGrp="1"/>
+          </p:cNvSpPr>
+          <p:nvPr>
+            <p:ph type="ftr" sz="quarter" idx="11"/>
+          </p:nvPr>
+        </p:nvSpPr>
+        <p:spPr>
+          <a:xfrm>
+            <a:off x="533400" y="6356350"/>
+            <a:ext cx="7772400" cy="365125"/>
+          </a:xfrm>
+        </p:spPr>
+        <p:txBody>
+          <a:bodyPr/>
+          <a:lstStyle/>
+          <a:p>
+            <a:r>
+              <a:rPr lang="en-US" dirty="0"/>
+              <a:t>RAO, A.; GEORGEFF, M. BDI-agents: from theory to practice. </a:t>
+            </a:r>
+            <a:r>
+              <a:rPr lang="en-US" b="1" dirty="0"/>
+              <a:t>In: Proceedings of the First Intl. Conference on </a:t>
+            </a:r>
+            <a:r>
+              <a:rPr lang="en-US" b="1" dirty="0" err="1"/>
+              <a:t>Multiagent</a:t>
+            </a:r>
+            <a:r>
+              <a:rPr lang="en-US" b="1" dirty="0"/>
+              <a:t> Systems</a:t>
+            </a:r>
+            <a:r>
+              <a:rPr lang="en-US" dirty="0"/>
+              <a:t>, p. 312–319, 1995.</a:t>
+            </a:r>
+          </a:p>
+        </p:txBody>
+      </p:sp>
+      <p:pic>
+        <p:nvPicPr>
+          <p:cNvPr id="6" name="Picture 5"/>
+          <p:cNvPicPr>
+            <a:picLocks noChangeAspect="1"/>
+          </p:cNvPicPr>
+          <p:nvPr/>
+        </p:nvPicPr>
+        <p:blipFill>
+          <a:blip r:embed="rId3" cstate="print"/>
+          <a:srcRect/>
+          <a:stretch>
+            <a:fillRect/>
+          </a:stretch>
+        </p:blipFill>
+        <p:spPr bwMode="auto">
+          <a:xfrm>
+            <a:off x="609600" y="76200"/>
+            <a:ext cx="7924800" cy="5960709"/>
+          </a:xfrm>
+          <a:prstGeom prst="rect">
+            <a:avLst/>
+          </a:prstGeom>
+          <a:noFill/>
+          <a:ln w="9525">
+            <a:noFill/>
+            <a:miter lim="800000"/>
+            <a:headEnd/>
+            <a:tailEnd/>
+          </a:ln>
+        </p:spPr>
+      </p:pic>
+      <p:sp>
+        <p:nvSpPr>
+          <p:cNvPr id="7" name="Slide Number Placeholder 6"/>
+          <p:cNvSpPr>
+            <a:spLocks noGrp="1"/>
+          </p:cNvSpPr>
+          <p:nvPr>
+            <p:ph type="sldNum" sz="quarter" idx="12"/>
+          </p:nvPr>
+        </p:nvSpPr>
+        <p:spPr/>
+        <p:txBody>
+          <a:bodyPr/>
+          <a:lstStyle/>
+          <a:p>
+            <a:fld id="{C2596E1E-EB91-4095-BA0D-C3A644609A86}" type="slidenum">
+              <a:rPr lang="en-US" smtClean="0"/>
+              <a:pPr/>
+              <a:t>31</a:t>
+            </a:fld>
+            <a:endParaRPr lang="en-US"/>
+          </a:p>
+        </p:txBody>
+      </p:sp>
+      <p:sp>
+        <p:nvSpPr>
+          <p:cNvPr id="8" name="TextBox 7"/>
+          <p:cNvSpPr txBox="1"/>
+          <p:nvPr/>
+        </p:nvSpPr>
+        <p:spPr>
+          <a:xfrm>
+            <a:off x="4724400" y="5943600"/>
+            <a:ext cx="1447800" cy="369332"/>
+          </a:xfrm>
+          <a:prstGeom prst="rect">
+            <a:avLst/>
+          </a:prstGeom>
+          <a:noFill/>
+        </p:spPr>
+        <p:txBody>
+          <a:bodyPr wrap="square" rtlCol="0">
+            <a:spAutoFit/>
+          </a:bodyPr>
+          <a:lstStyle/>
+          <a:p>
+            <a:r>
+              <a:rPr lang="pt-BR" dirty="0" smtClean="0"/>
+              <a:t>200 &gt; 144.8</a:t>
+            </a:r>
+            <a:endParaRPr lang="pt-BR" dirty="0"/>
+          </a:p>
+        </p:txBody>
+      </p:sp>
+    </p:spTree>
+  </p:cSld>
+  <p:clrMapOvr>
+    <a:masterClrMapping/>
+  </p:clrMapOvr>
+  <p:timing>
+    <p:tnLst>
+      <p:par>
+        <p:cTn id="1" dur="indefinite" restart="never" nodeType="tmRoot"/>
+      </p:par>
+    </p:tnLst>
+  </p:timing>
+</p:sld>
+</file>
+
+<file path=ppt/slides/slide32.xml><?xml version="1.0" encoding="utf-8"?>
+<p:sld xmlns:a="http://schemas.openxmlformats.org/drawingml/2006/main" xmlns:r="http://schemas.openxmlformats.org/officeDocument/2006/relationships" xmlns:p="http://schemas.openxmlformats.org/presentationml/2006/main">
+  <p:cSld>
+    <p:spTree>
+      <p:nvGrpSpPr>
+        <p:cNvPr id="1" name=""/>
+        <p:cNvGrpSpPr/>
+        <p:nvPr/>
+      </p:nvGrpSpPr>
+      <p:grpSpPr>
+        <a:xfrm>
+          <a:off x="0" y="0"/>
+          <a:ext cx="0" cy="0"/>
+          <a:chOff x="0" y="0"/>
+          <a:chExt cx="0" cy="0"/>
+        </a:xfrm>
+      </p:grpSpPr>
+      <p:sp>
+        <p:nvSpPr>
+          <p:cNvPr id="2" name="Title 1"/>
+          <p:cNvSpPr>
+            <a:spLocks noGrp="1"/>
+          </p:cNvSpPr>
+          <p:nvPr>
+            <p:ph type="ctrTitle"/>
+          </p:nvPr>
+        </p:nvSpPr>
+        <p:spPr/>
+        <p:txBody>
+          <a:bodyPr>
+            <a:normAutofit fontScale="90000"/>
+          </a:bodyPr>
+          <a:lstStyle/>
+          <a:p>
+            <a:r>
+              <a:rPr lang="pt-BR" dirty="0" smtClean="0"/>
+              <a:t>Raciocínio</a:t>
+            </a:r>
+            <a:br>
+              <a:rPr lang="pt-BR" dirty="0" smtClean="0"/>
+            </a:br>
+            <a:r>
+              <a:rPr lang="pt-BR" dirty="0" smtClean="0"/>
+              <a:t>Introdução a Sistemas Multiagentes</a:t>
+            </a:r>
+            <a:endParaRPr lang="en-US" dirty="0"/>
+          </a:p>
+        </p:txBody>
+      </p:sp>
+      <p:sp>
+        <p:nvSpPr>
+          <p:cNvPr id="3" name="Subtitle 2"/>
+          <p:cNvSpPr>
+            <a:spLocks noGrp="1"/>
+          </p:cNvSpPr>
+          <p:nvPr>
+            <p:ph type="subTitle" idx="1"/>
+          </p:nvPr>
+        </p:nvSpPr>
+        <p:spPr/>
+        <p:txBody>
+          <a:bodyPr/>
+          <a:lstStyle/>
+          <a:p>
+            <a:r>
+              <a:rPr lang="pt-BR" dirty="0" err="1"/>
+              <a:t>Troy</a:t>
+            </a:r>
+            <a:r>
+              <a:rPr lang="pt-BR" dirty="0"/>
+              <a:t> C </a:t>
+            </a:r>
+            <a:r>
+              <a:rPr lang="pt-BR" dirty="0" err="1"/>
+              <a:t>Kohwalter</a:t>
+            </a:r>
+            <a:endParaRPr lang="en-US" dirty="0"/>
+          </a:p>
+        </p:txBody>
+      </p:sp>
+      <p:sp>
+        <p:nvSpPr>
+          <p:cNvPr id="4" name="Footer Placeholder 3"/>
+          <p:cNvSpPr>
+            <a:spLocks noGrp="1"/>
+          </p:cNvSpPr>
+          <p:nvPr>
+            <p:ph type="ftr" sz="quarter" idx="11"/>
+          </p:nvPr>
+        </p:nvSpPr>
+        <p:spPr/>
+        <p:txBody>
+          <a:bodyPr/>
+          <a:lstStyle/>
+          <a:p>
+            <a:endParaRPr lang="en-US"/>
+          </a:p>
+        </p:txBody>
+      </p:sp>
+    </p:spTree>
+  </p:cSld>
+  <p:clrMapOvr>
+    <a:masterClrMapping/>
+  </p:clrMapOvr>
+  <p:timing>
+    <p:tnLst>
+      <p:par>
+        <p:cTn id="1" dur="indefinite" restart="never" nodeType="tmRoot"/>
+      </p:par>
+    </p:tnLst>
+  </p:timing>
+</p:sld>
+</file>
+
+<file path=ppt/slides/slide33.xml><?xml version="1.0" encoding="utf-8"?>
+<p:sld xmlns:a="http://schemas.openxmlformats.org/drawingml/2006/main" xmlns:r="http://schemas.openxmlformats.org/officeDocument/2006/relationships" xmlns:p="http://schemas.openxmlformats.org/presentationml/2006/main">
+  <p:cSld>
+    <p:spTree>
+      <p:nvGrpSpPr>
+        <p:cNvPr id="1" name=""/>
+        <p:cNvGrpSpPr/>
+        <p:nvPr/>
+      </p:nvGrpSpPr>
+      <p:grpSpPr>
+        <a:xfrm>
+          <a:off x="0" y="0"/>
+          <a:ext cx="0" cy="0"/>
+          <a:chOff x="0" y="0"/>
+          <a:chExt cx="0" cy="0"/>
+        </a:xfrm>
+      </p:grpSpPr>
+      <p:sp>
+        <p:nvSpPr>
+          <p:cNvPr id="6" name="Title 5"/>
+          <p:cNvSpPr>
+            <a:spLocks noGrp="1"/>
+          </p:cNvSpPr>
+          <p:nvPr>
+            <p:ph type="ctrTitle"/>
+          </p:nvPr>
+        </p:nvSpPr>
+        <p:spPr/>
+        <p:txBody>
+          <a:bodyPr/>
+          <a:lstStyle/>
+          <a:p>
+            <a:r>
+              <a:rPr lang="pt-BR" dirty="0" smtClean="0"/>
+              <a:t>Trabalho Proposto</a:t>
+            </a:r>
+            <a:endParaRPr lang="pt-BR" dirty="0"/>
+          </a:p>
+        </p:txBody>
+      </p:sp>
+      <p:sp>
+        <p:nvSpPr>
+          <p:cNvPr id="7" name="Subtitle 6"/>
+          <p:cNvSpPr>
+            <a:spLocks noGrp="1"/>
+          </p:cNvSpPr>
+          <p:nvPr>
+            <p:ph type="subTitle" idx="1"/>
+          </p:nvPr>
+        </p:nvSpPr>
+        <p:spPr/>
+        <p:txBody>
+          <a:bodyPr/>
+          <a:lstStyle/>
+          <a:p>
+            <a:r>
+              <a:rPr lang="pt-BR" dirty="0" err="1" smtClean="0"/>
+              <a:t>Troy</a:t>
+            </a:r>
+            <a:r>
+              <a:rPr lang="pt-BR" dirty="0" smtClean="0"/>
+              <a:t> C </a:t>
+            </a:r>
+            <a:r>
+              <a:rPr lang="pt-BR" dirty="0" err="1" smtClean="0"/>
+              <a:t>Kohwalter</a:t>
+            </a:r>
+            <a:endParaRPr lang="pt-BR" dirty="0"/>
+          </a:p>
+        </p:txBody>
+      </p:sp>
+      <p:sp>
+        <p:nvSpPr>
+          <p:cNvPr id="4" name="Footer Placeholder 3"/>
+          <p:cNvSpPr>
+            <a:spLocks noGrp="1"/>
+          </p:cNvSpPr>
+          <p:nvPr>
+            <p:ph type="ftr" sz="quarter" idx="11"/>
+          </p:nvPr>
+        </p:nvSpPr>
+        <p:spPr/>
+        <p:txBody>
+          <a:bodyPr/>
+          <a:lstStyle/>
+          <a:p>
+            <a:endParaRPr lang="en-US"/>
+          </a:p>
+        </p:txBody>
+      </p:sp>
+      <p:sp>
+        <p:nvSpPr>
+          <p:cNvPr id="5" name="Slide Number Placeholder 4"/>
+          <p:cNvSpPr>
+            <a:spLocks noGrp="1"/>
+          </p:cNvSpPr>
+          <p:nvPr>
+            <p:ph type="sldNum" sz="quarter" idx="12"/>
+          </p:nvPr>
+        </p:nvSpPr>
+        <p:spPr/>
+        <p:txBody>
+          <a:bodyPr/>
+          <a:lstStyle/>
+          <a:p>
+            <a:fld id="{C2596E1E-EB91-4095-BA0D-C3A644609A86}" type="slidenum">
+              <a:rPr lang="en-US" smtClean="0"/>
+              <a:pPr/>
+              <a:t>33</a:t>
+            </a:fld>
+            <a:endParaRPr lang="en-US"/>
+          </a:p>
+        </p:txBody>
+      </p:sp>
+    </p:spTree>
+  </p:cSld>
+  <p:clrMapOvr>
+    <a:masterClrMapping/>
+  </p:clrMapOvr>
+</p:sld>
+</file>
+
+<file path=ppt/slides/slide34.xml><?xml version="1.0" encoding="utf-8"?>
+<p:sld xmlns:a="http://schemas.openxmlformats.org/drawingml/2006/main" xmlns:r="http://schemas.openxmlformats.org/officeDocument/2006/relationships" xmlns:p="http://schemas.openxmlformats.org/presentationml/2006/main">
+  <p:cSld>
+    <p:spTree>
+      <p:nvGrpSpPr>
+        <p:cNvPr id="1" name=""/>
+        <p:cNvGrpSpPr/>
+        <p:nvPr/>
+      </p:nvGrpSpPr>
+      <p:grpSpPr>
+        <a:xfrm>
+          <a:off x="0" y="0"/>
+          <a:ext cx="0" cy="0"/>
+          <a:chOff x="0" y="0"/>
+          <a:chExt cx="0" cy="0"/>
+        </a:xfrm>
+      </p:grpSpPr>
+      <p:sp>
+        <p:nvSpPr>
           <p:cNvPr id="2" name="Title 1"/>
           <p:cNvSpPr>
             <a:spLocks noGrp="1"/>
@@ -9014,6 +9764,87 @@
               <a:t>Manager</a:t>
             </a:r>
             <a:endParaRPr lang="pt-BR" dirty="0"/>
+          </a:p>
+        </p:txBody>
+      </p:sp>
+      <p:sp>
+        <p:nvSpPr>
+          <p:cNvPr id="3" name="Content Placeholder 2"/>
+          <p:cNvSpPr>
+            <a:spLocks noGrp="1"/>
+          </p:cNvSpPr>
+          <p:nvPr>
+            <p:ph idx="1"/>
+          </p:nvPr>
+        </p:nvSpPr>
+        <p:spPr/>
+        <p:txBody>
+          <a:bodyPr>
+            <a:normAutofit/>
+          </a:bodyPr>
+          <a:lstStyle/>
+          <a:p>
+            <a:r>
+              <a:rPr lang="pt-BR" dirty="0" smtClean="0"/>
+              <a:t>Jogador</a:t>
+            </a:r>
+          </a:p>
+          <a:p>
+            <a:pPr lvl="1"/>
+            <a:r>
+              <a:rPr lang="pt-BR" dirty="0" smtClean="0"/>
+              <a:t>Ambiente de trabalho</a:t>
+            </a:r>
+          </a:p>
+          <a:p>
+            <a:pPr lvl="1"/>
+            <a:r>
+              <a:rPr lang="pt-BR" dirty="0" smtClean="0"/>
+              <a:t>Equipe</a:t>
+            </a:r>
+          </a:p>
+          <a:p>
+            <a:pPr lvl="2"/>
+            <a:r>
+              <a:rPr lang="pt-BR" dirty="0" err="1" smtClean="0"/>
+              <a:t>Funcionarios</a:t>
+            </a:r>
+            <a:endParaRPr lang="pt-BR" dirty="0" smtClean="0"/>
+          </a:p>
+          <a:p>
+            <a:pPr lvl="3"/>
+            <a:r>
+              <a:rPr lang="pt-BR" dirty="0" smtClean="0"/>
+              <a:t>Atributos</a:t>
+            </a:r>
+          </a:p>
+          <a:p>
+            <a:pPr lvl="3"/>
+            <a:r>
+              <a:rPr lang="pt-BR" dirty="0" smtClean="0"/>
+              <a:t>Especializações</a:t>
+            </a:r>
+          </a:p>
+          <a:p>
+            <a:pPr lvl="3"/>
+            <a:r>
+              <a:rPr lang="pt-BR" dirty="0" smtClean="0"/>
+              <a:t>Papeis</a:t>
+            </a:r>
+          </a:p>
+          <a:p>
+            <a:pPr lvl="1"/>
+            <a:r>
+              <a:rPr lang="pt-BR" dirty="0" smtClean="0"/>
+              <a:t>Desenvolve Softwares</a:t>
+            </a:r>
+          </a:p>
+          <a:p>
+            <a:pPr lvl="2"/>
+            <a:r>
+              <a:rPr lang="pt-BR" dirty="0" smtClean="0"/>
+              <a:t>Segue os requisitos do cliente</a:t>
+            </a:r>
           </a:p>
         </p:txBody>
       </p:sp>
@@ -9108,7 +9939,166 @@
             <a:fld id="{C2596E1E-EB91-4095-BA0D-C3A644609A86}" type="slidenum">
               <a:rPr lang="en-US" smtClean="0"/>
               <a:pPr/>
-              <a:t>31</a:t>
+              <a:t>34</a:t>
+            </a:fld>
+            <a:endParaRPr lang="en-US" dirty="0"/>
+          </a:p>
+        </p:txBody>
+      </p:sp>
+    </p:spTree>
+  </p:cSld>
+  <p:clrMapOvr>
+    <a:masterClrMapping/>
+  </p:clrMapOvr>
+</p:sld>
+</file>
+
+<file path=ppt/slides/slide35.xml><?xml version="1.0" encoding="utf-8"?>
+<p:sld xmlns:a="http://schemas.openxmlformats.org/drawingml/2006/main" xmlns:r="http://schemas.openxmlformats.org/officeDocument/2006/relationships" xmlns:p="http://schemas.openxmlformats.org/presentationml/2006/main">
+  <p:cSld>
+    <p:spTree>
+      <p:nvGrpSpPr>
+        <p:cNvPr id="1" name=""/>
+        <p:cNvGrpSpPr/>
+        <p:nvPr/>
+      </p:nvGrpSpPr>
+      <p:grpSpPr>
+        <a:xfrm>
+          <a:off x="0" y="0"/>
+          <a:ext cx="0" cy="0"/>
+          <a:chOff x="0" y="0"/>
+          <a:chExt cx="0" cy="0"/>
+        </a:xfrm>
+      </p:grpSpPr>
+      <p:sp>
+        <p:nvSpPr>
+          <p:cNvPr id="2" name="Title 1"/>
+          <p:cNvSpPr>
+            <a:spLocks noGrp="1"/>
+          </p:cNvSpPr>
+          <p:nvPr>
+            <p:ph type="title"/>
+          </p:nvPr>
+        </p:nvSpPr>
+        <p:spPr/>
+        <p:txBody>
+          <a:bodyPr>
+            <a:normAutofit/>
+          </a:bodyPr>
+          <a:lstStyle/>
+          <a:p>
+            <a:r>
+              <a:rPr lang="pt-BR" dirty="0"/>
+              <a:t>Software </a:t>
+            </a:r>
+            <a:r>
+              <a:rPr lang="pt-BR" dirty="0" err="1"/>
+              <a:t>Development</a:t>
+            </a:r>
+            <a:r>
+              <a:rPr lang="pt-BR" dirty="0"/>
+              <a:t> </a:t>
+            </a:r>
+            <a:r>
+              <a:rPr lang="pt-BR" dirty="0" smtClean="0"/>
+              <a:t>Manager</a:t>
+            </a:r>
+            <a:endParaRPr lang="pt-BR" dirty="0"/>
+          </a:p>
+        </p:txBody>
+      </p:sp>
+      <p:sp>
+        <p:nvSpPr>
+          <p:cNvPr id="4" name="Footer Placeholder 3"/>
+          <p:cNvSpPr>
+            <a:spLocks noGrp="1"/>
+          </p:cNvSpPr>
+          <p:nvPr>
+            <p:ph type="ftr" sz="quarter" idx="11"/>
+          </p:nvPr>
+        </p:nvSpPr>
+        <p:spPr>
+          <a:xfrm>
+            <a:off x="457200" y="6356350"/>
+            <a:ext cx="8001000" cy="365125"/>
+          </a:xfrm>
+        </p:spPr>
+        <p:txBody>
+          <a:bodyPr/>
+          <a:lstStyle/>
+          <a:p>
+            <a:r>
+              <a:rPr lang="pt-BR" dirty="0"/>
+              <a:t>KOHWALTER, T.; CLUA, E.; MURTA, L. </a:t>
+            </a:r>
+            <a:r>
+              <a:rPr lang="pt-BR" b="1" dirty="0"/>
+              <a:t>SDM – </a:t>
+            </a:r>
+            <a:r>
+              <a:rPr lang="pt-BR" b="1" dirty="0" err="1"/>
+              <a:t>An</a:t>
+            </a:r>
+            <a:r>
+              <a:rPr lang="pt-BR" b="1" dirty="0"/>
+              <a:t> </a:t>
+            </a:r>
+            <a:r>
+              <a:rPr lang="pt-BR" b="1" dirty="0" err="1"/>
+              <a:t>Educational</a:t>
+            </a:r>
+            <a:r>
+              <a:rPr lang="pt-BR" b="1" dirty="0"/>
+              <a:t> Game for Software </a:t>
+            </a:r>
+            <a:r>
+              <a:rPr lang="pt-BR" b="1" dirty="0" err="1"/>
+              <a:t>Engineering</a:t>
+            </a:r>
+            <a:r>
+              <a:rPr lang="pt-BR" dirty="0"/>
+              <a:t>. . Salvador: In: X </a:t>
+            </a:r>
+            <a:r>
+              <a:rPr lang="pt-BR" dirty="0" err="1"/>
+              <a:t>SBGames</a:t>
+            </a:r>
+            <a:r>
+              <a:rPr lang="pt-BR" dirty="0"/>
+              <a:t>. , 2011</a:t>
+            </a:r>
+            <a:endParaRPr lang="en-US" dirty="0"/>
+          </a:p>
+          <a:p>
+            <a:r>
+              <a:rPr lang="en-US" dirty="0" smtClean="0">
+                <a:hlinkClick r:id="rId2"/>
+              </a:rPr>
+              <a:t>http://www.ic.uff.br/~tkohwalter/sdm/</a:t>
+            </a:r>
+            <a:endParaRPr lang="en-US" dirty="0"/>
+          </a:p>
+        </p:txBody>
+      </p:sp>
+      <p:sp>
+        <p:nvSpPr>
+          <p:cNvPr id="5" name="Slide Number Placeholder 4"/>
+          <p:cNvSpPr>
+            <a:spLocks noGrp="1"/>
+          </p:cNvSpPr>
+          <p:nvPr>
+            <p:ph type="sldNum" sz="quarter" idx="12"/>
+          </p:nvPr>
+        </p:nvSpPr>
+        <p:spPr/>
+        <p:txBody>
+          <a:bodyPr/>
+          <a:lstStyle/>
+          <a:p>
+            <a:fld id="{C2596E1E-EB91-4095-BA0D-C3A644609A86}" type="slidenum">
+              <a:rPr lang="en-US" smtClean="0"/>
+              <a:pPr/>
+              <a:t>35</a:t>
             </a:fld>
             <a:endParaRPr lang="en-US" dirty="0"/>
           </a:p>
@@ -9154,7 +10144,7 @@
 </p:sld>
 </file>
 
-<file path=ppt/slides/slide32.xml><?xml version="1.0" encoding="utf-8"?>
+<file path=ppt/slides/slide36.xml><?xml version="1.0" encoding="utf-8"?>
 <p:sld xmlns:a="http://schemas.openxmlformats.org/drawingml/2006/main" xmlns:r="http://schemas.openxmlformats.org/officeDocument/2006/relationships" xmlns:p="http://schemas.openxmlformats.org/presentationml/2006/main">
   <p:cSld>
     <p:spTree>
@@ -9314,7 +10304,7 @@
             <a:fld id="{C2596E1E-EB91-4095-BA0D-C3A644609A86}" type="slidenum">
               <a:rPr lang="en-US" smtClean="0"/>
               <a:pPr/>
-              <a:t>32</a:t>
+              <a:t>36</a:t>
             </a:fld>
             <a:endParaRPr lang="en-US" dirty="0"/>
           </a:p>
@@ -9360,7 +10350,7 @@
 </p:sld>
 </file>
 
-<file path=ppt/slides/slide33.xml><?xml version="1.0" encoding="utf-8"?>
+<file path=ppt/slides/slide37.xml><?xml version="1.0" encoding="utf-8"?>
 <p:sld xmlns:a="http://schemas.openxmlformats.org/drawingml/2006/main" xmlns:r="http://schemas.openxmlformats.org/officeDocument/2006/relationships" xmlns:p="http://schemas.openxmlformats.org/presentationml/2006/main">
   <p:cSld>
     <p:spTree>
@@ -9449,7 +10439,35 @@
             <a:pPr lvl="3"/>
             <a:r>
               <a:rPr lang="pt-BR" dirty="0" smtClean="0"/>
-              <a:t>Por decisões do jogador/gerente</a:t>
+              <a:t>Por decisões do </a:t>
+            </a:r>
+            <a:r>
+              <a:rPr lang="pt-BR" dirty="0" smtClean="0"/>
+              <a:t>jogador/gerente</a:t>
+            </a:r>
+          </a:p>
+          <a:p>
+            <a:pPr lvl="3"/>
+            <a:endParaRPr lang="pt-BR" dirty="0" smtClean="0"/>
+          </a:p>
+          <a:p>
+            <a:r>
+              <a:rPr lang="pt-BR" dirty="0" smtClean="0"/>
+              <a:t>Versão Antiga:</a:t>
+            </a:r>
+          </a:p>
+          <a:p>
+            <a:pPr lvl="1"/>
+            <a:r>
+              <a:rPr lang="pt-BR" dirty="0" smtClean="0"/>
+              <a:t>Papel faz tarefas fixas e imutáveis.</a:t>
+            </a:r>
+          </a:p>
+          <a:p>
+            <a:pPr lvl="2"/>
+            <a:r>
+              <a:rPr lang="pt-BR" dirty="0" smtClean="0"/>
+              <a:t>Programador sempre desenvolve</a:t>
             </a:r>
           </a:p>
         </p:txBody>
@@ -9491,7 +10509,7 @@
             <a:fld id="{C2596E1E-EB91-4095-BA0D-C3A644609A86}" type="slidenum">
               <a:rPr lang="en-US" smtClean="0"/>
               <a:pPr/>
-              <a:t>33</a:t>
+              <a:t>37</a:t>
             </a:fld>
             <a:endParaRPr lang="en-US"/>
           </a:p>
@@ -9505,7 +10523,7 @@
 </p:sld>
 </file>
 
-<file path=ppt/slides/slide34.xml><?xml version="1.0" encoding="utf-8"?>
+<file path=ppt/slides/slide38.xml><?xml version="1.0" encoding="utf-8"?>
 <p:sld xmlns:a="http://schemas.openxmlformats.org/drawingml/2006/main" xmlns:r="http://schemas.openxmlformats.org/officeDocument/2006/relationships" xmlns:p="http://schemas.openxmlformats.org/presentationml/2006/main">
   <p:cSld>
     <p:spTree>
@@ -9650,7 +10668,7 @@
             <a:fld id="{C2596E1E-EB91-4095-BA0D-C3A644609A86}" type="slidenum">
               <a:rPr lang="en-US" smtClean="0"/>
               <a:pPr/>
-              <a:t>34</a:t>
+              <a:t>38</a:t>
             </a:fld>
             <a:endParaRPr lang="en-US"/>
           </a:p>
@@ -9664,7 +10682,7 @@
 </p:sld>
 </file>
 
-<file path=ppt/slides/slide35.xml><?xml version="1.0" encoding="utf-8"?>
+<file path=ppt/slides/slide39.xml><?xml version="1.0" encoding="utf-8"?>
 <p:sld xmlns:a="http://schemas.openxmlformats.org/drawingml/2006/main" xmlns:r="http://schemas.openxmlformats.org/officeDocument/2006/relationships" xmlns:p="http://schemas.openxmlformats.org/presentationml/2006/main">
   <p:cSld>
     <p:spTree>
@@ -9756,7 +10774,7 @@
             <a:fld id="{C2596E1E-EB91-4095-BA0D-C3A644609A86}" type="slidenum">
               <a:rPr lang="en-US" smtClean="0"/>
               <a:pPr/>
-              <a:t>35</a:t>
+              <a:t>39</a:t>
             </a:fld>
             <a:endParaRPr lang="en-US"/>
           </a:p>
@@ -9802,7 +10820,7 @@
 </p:sld>
 </file>
 
-<file path=ppt/slides/slide36.xml><?xml version="1.0" encoding="utf-8"?>
+<file path=ppt/slides/slide4.xml><?xml version="1.0" encoding="utf-8"?>
 <p:sld xmlns:a="http://schemas.openxmlformats.org/drawingml/2006/main" xmlns:r="http://schemas.openxmlformats.org/officeDocument/2006/relationships" xmlns:p="http://schemas.openxmlformats.org/presentationml/2006/main">
   <p:cSld>
     <p:spTree>
@@ -9821,6 +10839,247 @@
       </p:grpSpPr>
       <p:sp>
         <p:nvSpPr>
+          <p:cNvPr id="2" name="Title 1"/>
+          <p:cNvSpPr>
+            <a:spLocks noGrp="1"/>
+          </p:cNvSpPr>
+          <p:nvPr>
+            <p:ph type="title"/>
+          </p:nvPr>
+        </p:nvSpPr>
+        <p:spPr/>
+        <p:txBody>
+          <a:bodyPr/>
+          <a:lstStyle/>
+          <a:p>
+            <a:r>
+              <a:rPr lang="pt-BR" dirty="0"/>
+              <a:t>Lógica </a:t>
+            </a:r>
+            <a:r>
+              <a:rPr lang="pt-BR" dirty="0" err="1"/>
+              <a:t>Fuzzy</a:t>
+            </a:r>
+            <a:endParaRPr lang="en-US" dirty="0"/>
+          </a:p>
+        </p:txBody>
+      </p:sp>
+      <p:sp>
+        <p:nvSpPr>
+          <p:cNvPr id="3" name="Content Placeholder 2"/>
+          <p:cNvSpPr>
+            <a:spLocks noGrp="1"/>
+          </p:cNvSpPr>
+          <p:nvPr>
+            <p:ph idx="1"/>
+          </p:nvPr>
+        </p:nvSpPr>
+        <p:spPr/>
+        <p:txBody>
+          <a:bodyPr/>
+          <a:lstStyle/>
+          <a:p>
+            <a:r>
+              <a:rPr lang="pt-BR" dirty="0"/>
+              <a:t>Extensão da lógica booleana</a:t>
+            </a:r>
+          </a:p>
+          <a:p>
+            <a:r>
+              <a:rPr lang="pt-BR" dirty="0"/>
+              <a:t>Admite Valores Intermediários</a:t>
+            </a:r>
+          </a:p>
+          <a:p>
+            <a:endParaRPr lang="en-US" dirty="0"/>
+          </a:p>
+        </p:txBody>
+      </p:sp>
+      <p:pic>
+        <p:nvPicPr>
+          <p:cNvPr id="4" name="Picture 3" descr="http://business-fundas.com/wp-content/uploads/2010/09/FUZZY-SET-THEORY.gif"/>
+          <p:cNvPicPr>
+            <a:picLocks noChangeAspect="1"/>
+          </p:cNvPicPr>
+          <p:nvPr/>
+        </p:nvPicPr>
+        <p:blipFill>
+          <a:blip r:embed="rId2" cstate="print"/>
+          <a:srcRect/>
+          <a:stretch>
+            <a:fillRect/>
+          </a:stretch>
+        </p:blipFill>
+        <p:spPr bwMode="auto">
+          <a:xfrm>
+            <a:off x="2286000" y="2743200"/>
+            <a:ext cx="4116846" cy="3505200"/>
+          </a:xfrm>
+          <a:prstGeom prst="rect">
+            <a:avLst/>
+          </a:prstGeom>
+          <a:noFill/>
+          <a:ln w="9525">
+            <a:noFill/>
+            <a:miter lim="800000"/>
+            <a:headEnd/>
+            <a:tailEnd/>
+          </a:ln>
+        </p:spPr>
+      </p:pic>
+      <p:sp>
+        <p:nvSpPr>
+          <p:cNvPr id="6" name="Footer Placeholder 3"/>
+          <p:cNvSpPr>
+            <a:spLocks noGrp="1"/>
+          </p:cNvSpPr>
+          <p:nvPr>
+            <p:ph type="ftr" sz="quarter" idx="11"/>
+          </p:nvPr>
+        </p:nvSpPr>
+        <p:spPr>
+          <a:xfrm>
+            <a:off x="685800" y="6356350"/>
+            <a:ext cx="7696200" cy="365125"/>
+          </a:xfrm>
+        </p:spPr>
+        <p:txBody>
+          <a:bodyPr/>
+          <a:lstStyle/>
+          <a:p>
+            <a:r>
+              <a:rPr lang="pt-BR" dirty="0"/>
+              <a:t>ZADEH, L. </a:t>
+            </a:r>
+            <a:r>
+              <a:rPr lang="pt-BR" dirty="0" err="1"/>
+              <a:t>Fuzzy</a:t>
+            </a:r>
+            <a:r>
+              <a:rPr lang="pt-BR" dirty="0"/>
+              <a:t> </a:t>
+            </a:r>
+            <a:r>
+              <a:rPr lang="pt-BR" dirty="0" err="1"/>
+              <a:t>Logic</a:t>
+            </a:r>
+            <a:r>
+              <a:rPr lang="pt-BR" dirty="0"/>
+              <a:t>. </a:t>
+            </a:r>
+            <a:r>
+              <a:rPr lang="pt-BR" b="1" dirty="0"/>
+              <a:t>In: IEEE </a:t>
+            </a:r>
+            <a:r>
+              <a:rPr lang="pt-BR" b="1" dirty="0" err="1"/>
+              <a:t>Computer</a:t>
+            </a:r>
+            <a:r>
+              <a:rPr lang="pt-BR" b="1" dirty="0"/>
+              <a:t> </a:t>
+            </a:r>
+            <a:r>
+              <a:rPr lang="pt-BR" b="1" dirty="0" err="1"/>
+              <a:t>Society</a:t>
+            </a:r>
+            <a:r>
+              <a:rPr lang="pt-BR" b="1" dirty="0"/>
+              <a:t> </a:t>
+            </a:r>
+            <a:r>
+              <a:rPr lang="pt-BR" b="1" dirty="0" err="1"/>
+              <a:t>Press</a:t>
+            </a:r>
+            <a:r>
+              <a:rPr lang="pt-BR" b="1" dirty="0"/>
+              <a:t> </a:t>
+            </a:r>
+            <a:r>
+              <a:rPr lang="pt-BR" b="1" dirty="0" err="1"/>
+              <a:t>Los</a:t>
+            </a:r>
+            <a:r>
+              <a:rPr lang="pt-BR" b="1" dirty="0"/>
+              <a:t> </a:t>
+            </a:r>
+            <a:r>
+              <a:rPr lang="pt-BR" b="1" dirty="0" err="1"/>
+              <a:t>Alamitos</a:t>
+            </a:r>
+            <a:r>
+              <a:rPr lang="pt-BR" b="1" dirty="0"/>
+              <a:t>, CA, USA</a:t>
+            </a:r>
+            <a:r>
+              <a:rPr lang="pt-BR" dirty="0"/>
+              <a:t>, v. 21, n. 4, p. 83–93, abr 1988. </a:t>
+            </a:r>
+            <a:endParaRPr lang="en-US" dirty="0"/>
+          </a:p>
+          <a:p>
+            <a:endParaRPr lang="en-US" dirty="0"/>
+          </a:p>
+        </p:txBody>
+      </p:sp>
+      <p:sp>
+        <p:nvSpPr>
+          <p:cNvPr id="7" name="Slide Number Placeholder 6"/>
+          <p:cNvSpPr>
+            <a:spLocks noGrp="1"/>
+          </p:cNvSpPr>
+          <p:nvPr>
+            <p:ph type="sldNum" sz="quarter" idx="12"/>
+          </p:nvPr>
+        </p:nvSpPr>
+        <p:spPr/>
+        <p:txBody>
+          <a:bodyPr/>
+          <a:lstStyle/>
+          <a:p>
+            <a:fld id="{C2596E1E-EB91-4095-BA0D-C3A644609A86}" type="slidenum">
+              <a:rPr lang="en-US" smtClean="0"/>
+              <a:pPr/>
+              <a:t>4</a:t>
+            </a:fld>
+            <a:endParaRPr lang="en-US"/>
+          </a:p>
+        </p:txBody>
+      </p:sp>
+    </p:spTree>
+  </p:cSld>
+  <p:clrMapOvr>
+    <a:masterClrMapping/>
+  </p:clrMapOvr>
+  <p:timing>
+    <p:tnLst>
+      <p:par>
+        <p:cTn id="1" dur="indefinite" restart="never" nodeType="tmRoot"/>
+      </p:par>
+    </p:tnLst>
+  </p:timing>
+</p:sld>
+</file>
+
+<file path=ppt/slides/slide40.xml><?xml version="1.0" encoding="utf-8"?>
+<p:sld xmlns:a="http://schemas.openxmlformats.org/drawingml/2006/main" xmlns:r="http://schemas.openxmlformats.org/officeDocument/2006/relationships" xmlns:p="http://schemas.openxmlformats.org/presentationml/2006/main">
+  <p:cSld>
+    <p:spTree>
+      <p:nvGrpSpPr>
+        <p:cNvPr id="1" name=""/>
+        <p:cNvGrpSpPr/>
+        <p:nvPr/>
+      </p:nvGrpSpPr>
+      <p:grpSpPr>
+        <a:xfrm>
+          <a:off x="0" y="0"/>
+          <a:ext cx="0" cy="0"/>
+          <a:chOff x="0" y="0"/>
+          <a:chExt cx="0" cy="0"/>
+        </a:xfrm>
+      </p:grpSpPr>
+      <p:sp>
+        <p:nvSpPr>
           <p:cNvPr id="4" name="Footer Placeholder 3"/>
           <p:cNvSpPr>
             <a:spLocks noGrp="1"/>
@@ -9856,7 +11115,7 @@
             <a:fld id="{C2596E1E-EB91-4095-BA0D-C3A644609A86}" type="slidenum">
               <a:rPr lang="en-US" smtClean="0"/>
               <a:pPr/>
-              <a:t>36</a:t>
+              <a:t>40</a:t>
             </a:fld>
             <a:endParaRPr lang="en-US"/>
           </a:p>
@@ -9902,7 +11161,7 @@
 </p:sld>
 </file>
 
-<file path=ppt/slides/slide37.xml><?xml version="1.0" encoding="utf-8"?>
+<file path=ppt/slides/slide41.xml><?xml version="1.0" encoding="utf-8"?>
 <p:sld xmlns:a="http://schemas.openxmlformats.org/drawingml/2006/main" xmlns:r="http://schemas.openxmlformats.org/officeDocument/2006/relationships" xmlns:p="http://schemas.openxmlformats.org/presentationml/2006/main">
   <p:cSld>
     <p:spTree>
@@ -9956,7 +11215,7 @@
             <a:fld id="{C2596E1E-EB91-4095-BA0D-C3A644609A86}" type="slidenum">
               <a:rPr lang="en-US" smtClean="0"/>
               <a:pPr/>
-              <a:t>37</a:t>
+              <a:t>41</a:t>
             </a:fld>
             <a:endParaRPr lang="en-US"/>
           </a:p>
@@ -10002,7 +11261,7 @@
 </p:sld>
 </file>
 
-<file path=ppt/slides/slide38.xml><?xml version="1.0" encoding="utf-8"?>
+<file path=ppt/slides/slide42.xml><?xml version="1.0" encoding="utf-8"?>
 <p:sld xmlns:a="http://schemas.openxmlformats.org/drawingml/2006/main" xmlns:r="http://schemas.openxmlformats.org/officeDocument/2006/relationships" xmlns:p="http://schemas.openxmlformats.org/presentationml/2006/main">
   <p:cSld>
     <p:spTree>
@@ -10056,7 +11315,7 @@
             <a:fld id="{C2596E1E-EB91-4095-BA0D-C3A644609A86}" type="slidenum">
               <a:rPr lang="en-US" smtClean="0"/>
               <a:pPr/>
-              <a:t>38</a:t>
+              <a:t>42</a:t>
             </a:fld>
             <a:endParaRPr lang="en-US"/>
           </a:p>
@@ -10109,7 +11368,7 @@
 </p:sld>
 </file>
 
-<file path=ppt/slides/slide39.xml><?xml version="1.0" encoding="utf-8"?>
+<file path=ppt/slides/slide43.xml><?xml version="1.0" encoding="utf-8"?>
 <p:sld xmlns:a="http://schemas.openxmlformats.org/drawingml/2006/main" xmlns:r="http://schemas.openxmlformats.org/officeDocument/2006/relationships" xmlns:p="http://schemas.openxmlformats.org/presentationml/2006/main">
   <p:cSld>
     <p:spTree>
@@ -10248,7 +11507,7 @@
             <a:fld id="{C2596E1E-EB91-4095-BA0D-C3A644609A86}" type="slidenum">
               <a:rPr lang="en-US" smtClean="0"/>
               <a:pPr/>
-              <a:t>39</a:t>
+              <a:t>43</a:t>
             </a:fld>
             <a:endParaRPr lang="en-US" dirty="0"/>
           </a:p>
@@ -10301,7 +11560,7 @@
 </p:sld>
 </file>
 
-<file path=ppt/slides/slide4.xml><?xml version="1.0" encoding="utf-8"?>
+<file path=ppt/slides/slide44.xml><?xml version="1.0" encoding="utf-8"?>
 <p:sld xmlns:a="http://schemas.openxmlformats.org/drawingml/2006/main" xmlns:r="http://schemas.openxmlformats.org/officeDocument/2006/relationships" xmlns:p="http://schemas.openxmlformats.org/presentationml/2006/main">
   <p:cSld>
     <p:spTree>
@@ -10334,247 +11593,6 @@
           <a:lstStyle/>
           <a:p>
             <a:r>
-              <a:rPr lang="pt-BR" dirty="0"/>
-              <a:t>Lógica </a:t>
-            </a:r>
-            <a:r>
-              <a:rPr lang="pt-BR" dirty="0" err="1"/>
-              <a:t>Fuzzy</a:t>
-            </a:r>
-            <a:endParaRPr lang="en-US" dirty="0"/>
-          </a:p>
-        </p:txBody>
-      </p:sp>
-      <p:sp>
-        <p:nvSpPr>
-          <p:cNvPr id="3" name="Content Placeholder 2"/>
-          <p:cNvSpPr>
-            <a:spLocks noGrp="1"/>
-          </p:cNvSpPr>
-          <p:nvPr>
-            <p:ph idx="1"/>
-          </p:nvPr>
-        </p:nvSpPr>
-        <p:spPr/>
-        <p:txBody>
-          <a:bodyPr/>
-          <a:lstStyle/>
-          <a:p>
-            <a:r>
-              <a:rPr lang="pt-BR" dirty="0"/>
-              <a:t>Extensão da lógica booleana</a:t>
-            </a:r>
-          </a:p>
-          <a:p>
-            <a:r>
-              <a:rPr lang="pt-BR" dirty="0"/>
-              <a:t>Admite Valores Intermediários</a:t>
-            </a:r>
-          </a:p>
-          <a:p>
-            <a:endParaRPr lang="en-US" dirty="0"/>
-          </a:p>
-        </p:txBody>
-      </p:sp>
-      <p:pic>
-        <p:nvPicPr>
-          <p:cNvPr id="4" name="Picture 3" descr="http://business-fundas.com/wp-content/uploads/2010/09/FUZZY-SET-THEORY.gif"/>
-          <p:cNvPicPr>
-            <a:picLocks noChangeAspect="1"/>
-          </p:cNvPicPr>
-          <p:nvPr/>
-        </p:nvPicPr>
-        <p:blipFill>
-          <a:blip r:embed="rId2" cstate="print"/>
-          <a:srcRect/>
-          <a:stretch>
-            <a:fillRect/>
-          </a:stretch>
-        </p:blipFill>
-        <p:spPr bwMode="auto">
-          <a:xfrm>
-            <a:off x="2286000" y="2743200"/>
-            <a:ext cx="4116846" cy="3505200"/>
-          </a:xfrm>
-          <a:prstGeom prst="rect">
-            <a:avLst/>
-          </a:prstGeom>
-          <a:noFill/>
-          <a:ln w="9525">
-            <a:noFill/>
-            <a:miter lim="800000"/>
-            <a:headEnd/>
-            <a:tailEnd/>
-          </a:ln>
-        </p:spPr>
-      </p:pic>
-      <p:sp>
-        <p:nvSpPr>
-          <p:cNvPr id="6" name="Footer Placeholder 3"/>
-          <p:cNvSpPr>
-            <a:spLocks noGrp="1"/>
-          </p:cNvSpPr>
-          <p:nvPr>
-            <p:ph type="ftr" sz="quarter" idx="11"/>
-          </p:nvPr>
-        </p:nvSpPr>
-        <p:spPr>
-          <a:xfrm>
-            <a:off x="685800" y="6356350"/>
-            <a:ext cx="7696200" cy="365125"/>
-          </a:xfrm>
-        </p:spPr>
-        <p:txBody>
-          <a:bodyPr/>
-          <a:lstStyle/>
-          <a:p>
-            <a:r>
-              <a:rPr lang="pt-BR" dirty="0"/>
-              <a:t>ZADEH, L. </a:t>
-            </a:r>
-            <a:r>
-              <a:rPr lang="pt-BR" dirty="0" err="1"/>
-              <a:t>Fuzzy</a:t>
-            </a:r>
-            <a:r>
-              <a:rPr lang="pt-BR" dirty="0"/>
-              <a:t> </a:t>
-            </a:r>
-            <a:r>
-              <a:rPr lang="pt-BR" dirty="0" err="1"/>
-              <a:t>Logic</a:t>
-            </a:r>
-            <a:r>
-              <a:rPr lang="pt-BR" dirty="0"/>
-              <a:t>. </a:t>
-            </a:r>
-            <a:r>
-              <a:rPr lang="pt-BR" b="1" dirty="0"/>
-              <a:t>In: IEEE </a:t>
-            </a:r>
-            <a:r>
-              <a:rPr lang="pt-BR" b="1" dirty="0" err="1"/>
-              <a:t>Computer</a:t>
-            </a:r>
-            <a:r>
-              <a:rPr lang="pt-BR" b="1" dirty="0"/>
-              <a:t> </a:t>
-            </a:r>
-            <a:r>
-              <a:rPr lang="pt-BR" b="1" dirty="0" err="1"/>
-              <a:t>Society</a:t>
-            </a:r>
-            <a:r>
-              <a:rPr lang="pt-BR" b="1" dirty="0"/>
-              <a:t> </a:t>
-            </a:r>
-            <a:r>
-              <a:rPr lang="pt-BR" b="1" dirty="0" err="1"/>
-              <a:t>Press</a:t>
-            </a:r>
-            <a:r>
-              <a:rPr lang="pt-BR" b="1" dirty="0"/>
-              <a:t> </a:t>
-            </a:r>
-            <a:r>
-              <a:rPr lang="pt-BR" b="1" dirty="0" err="1"/>
-              <a:t>Los</a:t>
-            </a:r>
-            <a:r>
-              <a:rPr lang="pt-BR" b="1" dirty="0"/>
-              <a:t> </a:t>
-            </a:r>
-            <a:r>
-              <a:rPr lang="pt-BR" b="1" dirty="0" err="1"/>
-              <a:t>Alamitos</a:t>
-            </a:r>
-            <a:r>
-              <a:rPr lang="pt-BR" b="1" dirty="0"/>
-              <a:t>, CA, USA</a:t>
-            </a:r>
-            <a:r>
-              <a:rPr lang="pt-BR" dirty="0"/>
-              <a:t>, v. 21, n. 4, p. 83–93, abr 1988. </a:t>
-            </a:r>
-            <a:endParaRPr lang="en-US" dirty="0"/>
-          </a:p>
-          <a:p>
-            <a:endParaRPr lang="en-US" dirty="0"/>
-          </a:p>
-        </p:txBody>
-      </p:sp>
-      <p:sp>
-        <p:nvSpPr>
-          <p:cNvPr id="7" name="Slide Number Placeholder 6"/>
-          <p:cNvSpPr>
-            <a:spLocks noGrp="1"/>
-          </p:cNvSpPr>
-          <p:nvPr>
-            <p:ph type="sldNum" sz="quarter" idx="12"/>
-          </p:nvPr>
-        </p:nvSpPr>
-        <p:spPr/>
-        <p:txBody>
-          <a:bodyPr/>
-          <a:lstStyle/>
-          <a:p>
-            <a:fld id="{C2596E1E-EB91-4095-BA0D-C3A644609A86}" type="slidenum">
-              <a:rPr lang="en-US" smtClean="0"/>
-              <a:pPr/>
-              <a:t>4</a:t>
-            </a:fld>
-            <a:endParaRPr lang="en-US"/>
-          </a:p>
-        </p:txBody>
-      </p:sp>
-    </p:spTree>
-  </p:cSld>
-  <p:clrMapOvr>
-    <a:masterClrMapping/>
-  </p:clrMapOvr>
-  <p:timing>
-    <p:tnLst>
-      <p:par>
-        <p:cTn id="1" dur="indefinite" restart="never" nodeType="tmRoot"/>
-      </p:par>
-    </p:tnLst>
-  </p:timing>
-</p:sld>
-</file>
-
-<file path=ppt/slides/slide40.xml><?xml version="1.0" encoding="utf-8"?>
-<p:sld xmlns:a="http://schemas.openxmlformats.org/drawingml/2006/main" xmlns:r="http://schemas.openxmlformats.org/officeDocument/2006/relationships" xmlns:p="http://schemas.openxmlformats.org/presentationml/2006/main">
-  <p:cSld>
-    <p:spTree>
-      <p:nvGrpSpPr>
-        <p:cNvPr id="1" name=""/>
-        <p:cNvGrpSpPr/>
-        <p:nvPr/>
-      </p:nvGrpSpPr>
-      <p:grpSpPr>
-        <a:xfrm>
-          <a:off x="0" y="0"/>
-          <a:ext cx="0" cy="0"/>
-          <a:chOff x="0" y="0"/>
-          <a:chExt cx="0" cy="0"/>
-        </a:xfrm>
-      </p:grpSpPr>
-      <p:sp>
-        <p:nvSpPr>
-          <p:cNvPr id="2" name="Title 1"/>
-          <p:cNvSpPr>
-            <a:spLocks noGrp="1"/>
-          </p:cNvSpPr>
-          <p:nvPr>
-            <p:ph type="title"/>
-          </p:nvPr>
-        </p:nvSpPr>
-        <p:spPr/>
-        <p:txBody>
-          <a:bodyPr/>
-          <a:lstStyle/>
-          <a:p>
-            <a:r>
               <a:rPr lang="pt-BR" dirty="0" smtClean="0"/>
               <a:t>Escalonamento</a:t>
             </a:r>
@@ -10604,13 +11622,8 @@
           <a:p>
             <a:r>
               <a:rPr lang="pt-BR" dirty="0" smtClean="0"/>
-              <a:t>Simulação </a:t>
-            </a:r>
-            <a:r>
-              <a:rPr lang="pt-BR" dirty="0" smtClean="0"/>
-              <a:t>de escalonamento</a:t>
-            </a:r>
-            <a:endParaRPr lang="pt-BR" dirty="0" smtClean="0"/>
+              <a:t>Simulação de escalonamento</a:t>
+            </a:r>
           </a:p>
           <a:p>
             <a:pPr lvl="1"/>
@@ -10666,7 +11679,7 @@
             <a:fld id="{C2596E1E-EB91-4095-BA0D-C3A644609A86}" type="slidenum">
               <a:rPr lang="en-US" smtClean="0"/>
               <a:pPr/>
-              <a:t>40</a:t>
+              <a:t>44</a:t>
             </a:fld>
             <a:endParaRPr lang="en-US"/>
           </a:p>
@@ -10710,7 +11723,7 @@
 </p:sld>
 </file>
 
-<file path=ppt/slides/slide41.xml><?xml version="1.0" encoding="utf-8"?>
+<file path=ppt/slides/slide45.xml><?xml version="1.0" encoding="utf-8"?>
 <p:sld xmlns:a="http://schemas.openxmlformats.org/drawingml/2006/main" xmlns:r="http://schemas.openxmlformats.org/officeDocument/2006/relationships" xmlns:p="http://schemas.openxmlformats.org/presentationml/2006/main">
   <p:cSld>
     <p:spTree>
@@ -10849,7 +11862,7 @@
             <a:fld id="{C2596E1E-EB91-4095-BA0D-C3A644609A86}" type="slidenum">
               <a:rPr lang="en-US" smtClean="0"/>
               <a:pPr/>
-              <a:t>41</a:t>
+              <a:t>45</a:t>
             </a:fld>
             <a:endParaRPr lang="en-US" dirty="0"/>
           </a:p>
@@ -10895,7 +11908,7 @@
 </p:sld>
 </file>
 
-<file path=ppt/slides/slide42.xml><?xml version="1.0" encoding="utf-8"?>
+<file path=ppt/slides/slide46.xml><?xml version="1.0" encoding="utf-8"?>
 <p:sld xmlns:a="http://schemas.openxmlformats.org/drawingml/2006/main" xmlns:r="http://schemas.openxmlformats.org/officeDocument/2006/relationships" xmlns:p="http://schemas.openxmlformats.org/presentationml/2006/main">
   <p:cSld>
     <p:spTree>
@@ -10914,39 +11927,55 @@
       </p:grpSpPr>
       <p:sp>
         <p:nvSpPr>
-          <p:cNvPr id="2" name="Title 1"/>
-          <p:cNvSpPr>
-            <a:spLocks noGrp="1"/>
-          </p:cNvSpPr>
-          <p:nvPr>
-            <p:ph type="title"/>
-          </p:nvPr>
-        </p:nvSpPr>
-        <p:spPr/>
-        <p:txBody>
-          <a:bodyPr/>
-          <a:lstStyle/>
-          <a:p>
-            <a:endParaRPr lang="pt-BR"/>
-          </a:p>
-        </p:txBody>
-      </p:sp>
-      <p:sp>
-        <p:nvSpPr>
-          <p:cNvPr id="3" name="Content Placeholder 2"/>
-          <p:cNvSpPr>
-            <a:spLocks noGrp="1"/>
-          </p:cNvSpPr>
-          <p:nvPr>
-            <p:ph idx="1"/>
-          </p:nvPr>
-        </p:nvSpPr>
-        <p:spPr/>
-        <p:txBody>
-          <a:bodyPr/>
-          <a:lstStyle/>
-          <a:p>
-            <a:endParaRPr lang="pt-BR"/>
+          <p:cNvPr id="6" name="Title 5"/>
+          <p:cNvSpPr>
+            <a:spLocks noGrp="1"/>
+          </p:cNvSpPr>
+          <p:nvPr>
+            <p:ph type="ctrTitle"/>
+          </p:nvPr>
+        </p:nvSpPr>
+        <p:spPr/>
+        <p:txBody>
+          <a:bodyPr/>
+          <a:lstStyle/>
+          <a:p>
+            <a:r>
+              <a:rPr lang="pt-BR" dirty="0" smtClean="0"/>
+              <a:t>Trabalho Proposto</a:t>
+            </a:r>
+            <a:endParaRPr lang="pt-BR" dirty="0"/>
+          </a:p>
+        </p:txBody>
+      </p:sp>
+      <p:sp>
+        <p:nvSpPr>
+          <p:cNvPr id="7" name="Subtitle 6"/>
+          <p:cNvSpPr>
+            <a:spLocks noGrp="1"/>
+          </p:cNvSpPr>
+          <p:nvPr>
+            <p:ph type="subTitle" idx="1"/>
+          </p:nvPr>
+        </p:nvSpPr>
+        <p:spPr/>
+        <p:txBody>
+          <a:bodyPr/>
+          <a:lstStyle/>
+          <a:p>
+            <a:r>
+              <a:rPr lang="pt-BR" dirty="0" err="1" smtClean="0"/>
+              <a:t>Troy</a:t>
+            </a:r>
+            <a:r>
+              <a:rPr lang="pt-BR" dirty="0" smtClean="0"/>
+              <a:t> C </a:t>
+            </a:r>
+            <a:r>
+              <a:rPr lang="pt-BR" dirty="0" err="1" smtClean="0"/>
+              <a:t>Kohwalter</a:t>
+            </a:r>
+            <a:endParaRPr lang="pt-BR" dirty="0"/>
           </a:p>
         </p:txBody>
       </p:sp>
@@ -10987,7 +12016,7 @@
             <a:fld id="{C2596E1E-EB91-4095-BA0D-C3A644609A86}" type="slidenum">
               <a:rPr lang="en-US" smtClean="0"/>
               <a:pPr/>
-              <a:t>42</a:t>
+              <a:t>46</a:t>
             </a:fld>
             <a:endParaRPr lang="en-US"/>
           </a:p>
@@ -11062,8 +12091,21 @@
           <a:p>
             <a:r>
               <a:rPr lang="pt-BR" dirty="0"/>
-              <a:t>É possível fazer inferências do tipo Se X então Y.</a:t>
-            </a:r>
+              <a:t>É possível fazer inferências do tipo </a:t>
+            </a:r>
+            <a:r>
+              <a:rPr lang="pt-BR" dirty="0" smtClean="0"/>
+              <a:t>“Se </a:t>
+            </a:r>
+            <a:r>
+              <a:rPr lang="pt-BR" dirty="0"/>
+              <a:t>X então </a:t>
+            </a:r>
+            <a:r>
+              <a:rPr lang="pt-BR" dirty="0" smtClean="0"/>
+              <a:t>Y”.</a:t>
+            </a:r>
+            <a:endParaRPr lang="pt-BR" dirty="0"/>
           </a:p>
           <a:p>
             <a:pPr lvl="1"/>

</xml_diff>